<commit_message>
aulas ppt Eng Software
</commit_message>
<xml_diff>
--- a/01 Classes/Aulas 05 e 06 Refatoração e Code-Smell.pptx
+++ b/01 Classes/Aulas 05 e 06 Refatoração e Code-Smell.pptx
@@ -5,7 +5,7 @@
     <p:sldMasterId id="2147483648" r:id="rId1"/>
   </p:sldMasterIdLst>
   <p:notesMasterIdLst>
-    <p:notesMasterId r:id="rId41"/>
+    <p:notesMasterId r:id="rId43"/>
   </p:notesMasterIdLst>
   <p:sldIdLst>
     <p:sldId id="256" r:id="rId2"/>
@@ -46,7 +46,9 @@
     <p:sldId id="383" r:id="rId37"/>
     <p:sldId id="384" r:id="rId38"/>
     <p:sldId id="353" r:id="rId39"/>
-    <p:sldId id="309" r:id="rId40"/>
+    <p:sldId id="387" r:id="rId40"/>
+    <p:sldId id="386" r:id="rId41"/>
+    <p:sldId id="309" r:id="rId42"/>
   </p:sldIdLst>
   <p:sldSz cx="9144000" cy="5143500" type="screen16x9"/>
   <p:notesSz cx="6858000" cy="9144000"/>
@@ -2355,6 +2357,138 @@
         </p:txBody>
       </p:sp>
     </p:spTree>
+  </p:cSld>
+  <p:clrMapOvr>
+    <a:masterClrMapping/>
+  </p:clrMapOvr>
+</p:notes>
+</file>
+
+<file path=ppt/notesSlides/notesSlide37.xml><?xml version="1.0" encoding="utf-8"?>
+<p:notes xmlns:a="http://schemas.openxmlformats.org/drawingml/2006/main" xmlns:r="http://schemas.openxmlformats.org/officeDocument/2006/relationships" xmlns:p="http://schemas.openxmlformats.org/presentationml/2006/main">
+  <p:cSld>
+    <p:spTree>
+      <p:nvGrpSpPr>
+        <p:cNvPr id="1" name=""/>
+        <p:cNvGrpSpPr/>
+        <p:nvPr/>
+      </p:nvGrpSpPr>
+      <p:grpSpPr>
+        <a:xfrm>
+          <a:off x="0" y="0"/>
+          <a:ext cx="0" cy="0"/>
+          <a:chOff x="0" y="0"/>
+          <a:chExt cx="0" cy="0"/>
+        </a:xfrm>
+      </p:grpSpPr>
+      <p:sp>
+        <p:nvSpPr>
+          <p:cNvPr id="2" name="Espaço Reservado para Imagem de Slide 1"/>
+          <p:cNvSpPr>
+            <a:spLocks noGrp="1" noRot="1" noChangeAspect="1"/>
+          </p:cNvSpPr>
+          <p:nvPr>
+            <p:ph type="sldImg"/>
+          </p:nvPr>
+        </p:nvSpPr>
+        <p:spPr>
+          <a:xfrm>
+            <a:off x="381000" y="685800"/>
+            <a:ext cx="6096000" cy="3429000"/>
+          </a:xfrm>
+        </p:spPr>
+      </p:sp>
+      <p:sp>
+        <p:nvSpPr>
+          <p:cNvPr id="3" name="Espaço Reservado para Anotações 2"/>
+          <p:cNvSpPr>
+            <a:spLocks noGrp="1"/>
+          </p:cNvSpPr>
+          <p:nvPr>
+            <p:ph type="body" idx="1"/>
+          </p:nvPr>
+        </p:nvSpPr>
+        <p:spPr/>
+        <p:txBody>
+          <a:bodyPr/>
+          <a:lstStyle/>
+          <a:p>
+            <a:endParaRPr lang="pt-BR" dirty="0"/>
+          </a:p>
+        </p:txBody>
+      </p:sp>
+    </p:spTree>
+    <p:extLst>
+      <p:ext uri="{BB962C8B-B14F-4D97-AF65-F5344CB8AC3E}">
+        <p14:creationId xmlns:p14="http://schemas.microsoft.com/office/powerpoint/2010/main" val="1282894288"/>
+      </p:ext>
+    </p:extLst>
+  </p:cSld>
+  <p:clrMapOvr>
+    <a:masterClrMapping/>
+  </p:clrMapOvr>
+</p:notes>
+</file>
+
+<file path=ppt/notesSlides/notesSlide38.xml><?xml version="1.0" encoding="utf-8"?>
+<p:notes xmlns:a="http://schemas.openxmlformats.org/drawingml/2006/main" xmlns:r="http://schemas.openxmlformats.org/officeDocument/2006/relationships" xmlns:p="http://schemas.openxmlformats.org/presentationml/2006/main">
+  <p:cSld>
+    <p:spTree>
+      <p:nvGrpSpPr>
+        <p:cNvPr id="1" name=""/>
+        <p:cNvGrpSpPr/>
+        <p:nvPr/>
+      </p:nvGrpSpPr>
+      <p:grpSpPr>
+        <a:xfrm>
+          <a:off x="0" y="0"/>
+          <a:ext cx="0" cy="0"/>
+          <a:chOff x="0" y="0"/>
+          <a:chExt cx="0" cy="0"/>
+        </a:xfrm>
+      </p:grpSpPr>
+      <p:sp>
+        <p:nvSpPr>
+          <p:cNvPr id="2" name="Espaço Reservado para Imagem de Slide 1"/>
+          <p:cNvSpPr>
+            <a:spLocks noGrp="1" noRot="1" noChangeAspect="1"/>
+          </p:cNvSpPr>
+          <p:nvPr>
+            <p:ph type="sldImg"/>
+          </p:nvPr>
+        </p:nvSpPr>
+        <p:spPr>
+          <a:xfrm>
+            <a:off x="381000" y="685800"/>
+            <a:ext cx="6096000" cy="3429000"/>
+          </a:xfrm>
+        </p:spPr>
+      </p:sp>
+      <p:sp>
+        <p:nvSpPr>
+          <p:cNvPr id="3" name="Espaço Reservado para Anotações 2"/>
+          <p:cNvSpPr>
+            <a:spLocks noGrp="1"/>
+          </p:cNvSpPr>
+          <p:nvPr>
+            <p:ph type="body" idx="1"/>
+          </p:nvPr>
+        </p:nvSpPr>
+        <p:spPr/>
+        <p:txBody>
+          <a:bodyPr/>
+          <a:lstStyle/>
+          <a:p>
+            <a:endParaRPr lang="pt-BR" dirty="0"/>
+          </a:p>
+        </p:txBody>
+      </p:sp>
+    </p:spTree>
+    <p:extLst>
+      <p:ext uri="{BB962C8B-B14F-4D97-AF65-F5344CB8AC3E}">
+        <p14:creationId xmlns:p14="http://schemas.microsoft.com/office/powerpoint/2010/main" val="3221287036"/>
+      </p:ext>
+    </p:extLst>
   </p:cSld>
   <p:clrMapOvr>
     <a:masterClrMapping/>
@@ -7138,6 +7272,16 @@
               <a:t>Alterar nomes de variáveis, métodos e objetos para melhorar legibilidade do código – </a:t>
             </a:r>
             <a:r>
+              <a:rPr lang="pt-BR" sz="2200" b="1" dirty="0">
+                <a:solidFill>
+                  <a:srgbClr val="FF0000"/>
+                </a:solidFill>
+                <a:latin typeface="Arial" panose="020B0604020202020204" pitchFamily="34" charset="0"/>
+                <a:cs typeface="Arial" panose="020B0604020202020204" pitchFamily="34" charset="0"/>
+              </a:rPr>
+              <a:t>Double </a:t>
+            </a:r>
+            <a:r>
               <a:rPr lang="pt-BR" sz="2200" b="1" dirty="0" err="1">
                 <a:solidFill>
                   <a:srgbClr val="FF0000"/>
@@ -7145,7 +7289,7 @@
                 <a:latin typeface="Arial" panose="020B0604020202020204" pitchFamily="34" charset="0"/>
                 <a:cs typeface="Arial" panose="020B0604020202020204" pitchFamily="34" charset="0"/>
               </a:rPr>
-              <a:t>String</a:t>
+              <a:t>calc_imp_rnd_str</a:t>
             </a:r>
             <a:r>
               <a:rPr lang="pt-BR" sz="2200" b="1" dirty="0">
@@ -7155,6 +7299,46 @@
                 <a:latin typeface="Arial" panose="020B0604020202020204" pitchFamily="34" charset="0"/>
                 <a:cs typeface="Arial" panose="020B0604020202020204" pitchFamily="34" charset="0"/>
               </a:rPr>
+              <a:t>(</a:t>
+            </a:r>
+            <a:r>
+              <a:rPr lang="pt-BR" sz="2200" b="1" dirty="0" err="1">
+                <a:solidFill>
+                  <a:srgbClr val="FF0000"/>
+                </a:solidFill>
+                <a:latin typeface="Arial" panose="020B0604020202020204" pitchFamily="34" charset="0"/>
+                <a:cs typeface="Arial" panose="020B0604020202020204" pitchFamily="34" charset="0"/>
+              </a:rPr>
+              <a:t>int</a:t>
+            </a:r>
+            <a:r>
+              <a:rPr lang="pt-BR" sz="2200" b="1" dirty="0">
+                <a:solidFill>
+                  <a:srgbClr val="FF0000"/>
+                </a:solidFill>
+                <a:latin typeface="Arial" panose="020B0604020202020204" pitchFamily="34" charset="0"/>
+                <a:cs typeface="Arial" panose="020B0604020202020204" pitchFamily="34" charset="0"/>
+              </a:rPr>
+              <a:t> a, </a:t>
+            </a:r>
+            <a:r>
+              <a:rPr lang="pt-BR" sz="2200" b="1" dirty="0" err="1">
+                <a:solidFill>
+                  <a:srgbClr val="FF0000"/>
+                </a:solidFill>
+                <a:latin typeface="Arial" panose="020B0604020202020204" pitchFamily="34" charset="0"/>
+                <a:cs typeface="Arial" panose="020B0604020202020204" pitchFamily="34" charset="0"/>
+              </a:rPr>
+              <a:t>Txs</a:t>
+            </a:r>
+            <a:r>
+              <a:rPr lang="pt-BR" sz="2200" b="1" dirty="0">
+                <a:solidFill>
+                  <a:srgbClr val="FF0000"/>
+                </a:solidFill>
+                <a:latin typeface="Arial" panose="020B0604020202020204" pitchFamily="34" charset="0"/>
+                <a:cs typeface="Arial" panose="020B0604020202020204" pitchFamily="34" charset="0"/>
+              </a:rPr>
               <a:t> </a:t>
             </a:r>
             <a:r>
@@ -7165,7 +7349,7 @@
                 <a:latin typeface="Arial" panose="020B0604020202020204" pitchFamily="34" charset="0"/>
                 <a:cs typeface="Arial" panose="020B0604020202020204" pitchFamily="34" charset="0"/>
               </a:rPr>
-              <a:t>calc_imp_rnd_str</a:t>
+              <a:t>tx</a:t>
             </a:r>
             <a:r>
               <a:rPr lang="pt-BR" sz="2200" b="1" dirty="0">
@@ -7175,7 +7359,7 @@
                 <a:latin typeface="Arial" panose="020B0604020202020204" pitchFamily="34" charset="0"/>
                 <a:cs typeface="Arial" panose="020B0604020202020204" pitchFamily="34" charset="0"/>
               </a:rPr>
-              <a:t>(</a:t>
+              <a:t>, </a:t>
             </a:r>
             <a:r>
               <a:rPr lang="pt-BR" sz="2200" b="1" dirty="0" err="1">
@@ -7195,7 +7379,7 @@
                 <a:latin typeface="Arial" panose="020B0604020202020204" pitchFamily="34" charset="0"/>
                 <a:cs typeface="Arial" panose="020B0604020202020204" pitchFamily="34" charset="0"/>
               </a:rPr>
-              <a:t> a, </a:t>
+              <a:t> </a:t>
             </a:r>
             <a:r>
               <a:rPr lang="pt-BR" sz="2200" b="1" dirty="0" err="1">
@@ -7205,7 +7389,7 @@
                 <a:latin typeface="Arial" panose="020B0604020202020204" pitchFamily="34" charset="0"/>
                 <a:cs typeface="Arial" panose="020B0604020202020204" pitchFamily="34" charset="0"/>
               </a:rPr>
-              <a:t>Txs</a:t>
+              <a:t>inc</a:t>
             </a:r>
             <a:r>
               <a:rPr lang="pt-BR" sz="2200" b="1" dirty="0">
@@ -7215,94 +7399,24 @@
                 <a:latin typeface="Arial" panose="020B0604020202020204" pitchFamily="34" charset="0"/>
                 <a:cs typeface="Arial" panose="020B0604020202020204" pitchFamily="34" charset="0"/>
               </a:rPr>
-              <a:t> </a:t>
-            </a:r>
-            <a:r>
-              <a:rPr lang="pt-BR" sz="2200" b="1" dirty="0" err="1">
-                <a:solidFill>
-                  <a:srgbClr val="FF0000"/>
-                </a:solidFill>
-                <a:latin typeface="Arial" panose="020B0604020202020204" pitchFamily="34" charset="0"/>
-                <a:cs typeface="Arial" panose="020B0604020202020204" pitchFamily="34" charset="0"/>
-              </a:rPr>
-              <a:t>tx</a:t>
+              <a:t>)</a:t>
+            </a:r>
+            <a:r>
+              <a:rPr lang="pt-BR" sz="2200" dirty="0">
+                <a:latin typeface="Arial" panose="020B0604020202020204" pitchFamily="34" charset="0"/>
+                <a:cs typeface="Arial" panose="020B0604020202020204" pitchFamily="34" charset="0"/>
+              </a:rPr>
+              <a:t> -&gt; </a:t>
             </a:r>
             <a:r>
               <a:rPr lang="pt-BR" sz="2200" b="1" dirty="0">
                 <a:solidFill>
-                  <a:srgbClr val="FF0000"/>
-                </a:solidFill>
-                <a:latin typeface="Arial" panose="020B0604020202020204" pitchFamily="34" charset="0"/>
-                <a:cs typeface="Arial" panose="020B0604020202020204" pitchFamily="34" charset="0"/>
-              </a:rPr>
-              <a:t>, </a:t>
-            </a:r>
-            <a:r>
-              <a:rPr lang="pt-BR" sz="2200" b="1" dirty="0" err="1">
-                <a:solidFill>
-                  <a:srgbClr val="FF0000"/>
-                </a:solidFill>
-                <a:latin typeface="Arial" panose="020B0604020202020204" pitchFamily="34" charset="0"/>
-                <a:cs typeface="Arial" panose="020B0604020202020204" pitchFamily="34" charset="0"/>
-              </a:rPr>
-              <a:t>int</a:t>
-            </a:r>
-            <a:r>
-              <a:rPr lang="pt-BR" sz="2200" b="1" dirty="0">
-                <a:solidFill>
-                  <a:srgbClr val="FF0000"/>
-                </a:solidFill>
-                <a:latin typeface="Arial" panose="020B0604020202020204" pitchFamily="34" charset="0"/>
-                <a:cs typeface="Arial" panose="020B0604020202020204" pitchFamily="34" charset="0"/>
-              </a:rPr>
-              <a:t> </a:t>
-            </a:r>
-            <a:r>
-              <a:rPr lang="pt-BR" sz="2200" b="1" dirty="0" err="1">
-                <a:solidFill>
-                  <a:srgbClr val="FF0000"/>
-                </a:solidFill>
-                <a:latin typeface="Arial" panose="020B0604020202020204" pitchFamily="34" charset="0"/>
-                <a:cs typeface="Arial" panose="020B0604020202020204" pitchFamily="34" charset="0"/>
-              </a:rPr>
-              <a:t>inc</a:t>
-            </a:r>
-            <a:r>
-              <a:rPr lang="pt-BR" sz="2200" b="1" dirty="0">
-                <a:solidFill>
-                  <a:srgbClr val="FF0000"/>
-                </a:solidFill>
-                <a:latin typeface="Arial" panose="020B0604020202020204" pitchFamily="34" charset="0"/>
-                <a:cs typeface="Arial" panose="020B0604020202020204" pitchFamily="34" charset="0"/>
-              </a:rPr>
-              <a:t>)</a:t>
-            </a:r>
-            <a:r>
-              <a:rPr lang="pt-BR" sz="2200" dirty="0">
-                <a:latin typeface="Arial" panose="020B0604020202020204" pitchFamily="34" charset="0"/>
-                <a:cs typeface="Arial" panose="020B0604020202020204" pitchFamily="34" charset="0"/>
-              </a:rPr>
-              <a:t> -&gt; </a:t>
-            </a:r>
-            <a:r>
-              <a:rPr lang="pt-BR" sz="2200" b="1" dirty="0" err="1">
-                <a:solidFill>
                   <a:srgbClr val="0070C0"/>
                 </a:solidFill>
                 <a:latin typeface="Arial" panose="020B0604020202020204" pitchFamily="34" charset="0"/>
                 <a:cs typeface="Arial" panose="020B0604020202020204" pitchFamily="34" charset="0"/>
               </a:rPr>
-              <a:t>String</a:t>
-            </a:r>
-            <a:r>
-              <a:rPr lang="pt-BR" sz="2200" b="1" dirty="0">
-                <a:solidFill>
-                  <a:srgbClr val="0070C0"/>
-                </a:solidFill>
-                <a:latin typeface="Arial" panose="020B0604020202020204" pitchFamily="34" charset="0"/>
-                <a:cs typeface="Arial" panose="020B0604020202020204" pitchFamily="34" charset="0"/>
-              </a:rPr>
-              <a:t> </a:t>
+              <a:t>Double </a:t>
             </a:r>
             <a:r>
               <a:rPr lang="pt-BR" sz="2200" b="1" dirty="0" err="1">
@@ -8844,32 +8958,39 @@
               <a:t>Em programação, </a:t>
             </a:r>
             <a:r>
-              <a:rPr lang="pt-BR" sz="2400" dirty="0" err="1">
+              <a:rPr lang="pt-BR" sz="2400" b="1" dirty="0" err="1">
                 <a:latin typeface="Arial" panose="020B0604020202020204" pitchFamily="34" charset="0"/>
                 <a:cs typeface="Arial" panose="020B0604020202020204" pitchFamily="34" charset="0"/>
               </a:rPr>
               <a:t>code</a:t>
             </a:r>
             <a:r>
+              <a:rPr lang="pt-BR" sz="2400" b="1" dirty="0">
+                <a:latin typeface="Arial" panose="020B0604020202020204" pitchFamily="34" charset="0"/>
+                <a:cs typeface="Arial" panose="020B0604020202020204" pitchFamily="34" charset="0"/>
+              </a:rPr>
+              <a:t> </a:t>
+            </a:r>
+            <a:r>
+              <a:rPr lang="pt-BR" sz="2400" b="1" dirty="0" err="1">
+                <a:latin typeface="Arial" panose="020B0604020202020204" pitchFamily="34" charset="0"/>
+                <a:cs typeface="Arial" panose="020B0604020202020204" pitchFamily="34" charset="0"/>
+              </a:rPr>
+              <a:t>smell</a:t>
+            </a:r>
+            <a:r>
+              <a:rPr lang="pt-BR" sz="2400" b="1" dirty="0">
+                <a:latin typeface="Arial" panose="020B0604020202020204" pitchFamily="34" charset="0"/>
+                <a:cs typeface="Arial" panose="020B0604020202020204" pitchFamily="34" charset="0"/>
+              </a:rPr>
+              <a:t> </a:t>
+            </a:r>
+            <a:r>
               <a:rPr lang="pt-BR" sz="2400" dirty="0">
                 <a:latin typeface="Arial" panose="020B0604020202020204" pitchFamily="34" charset="0"/>
                 <a:cs typeface="Arial" panose="020B0604020202020204" pitchFamily="34" charset="0"/>
               </a:rPr>
-              <a:t> </a:t>
-            </a:r>
-            <a:r>
-              <a:rPr lang="pt-BR" sz="2400" dirty="0" err="1">
-                <a:latin typeface="Arial" panose="020B0604020202020204" pitchFamily="34" charset="0"/>
-                <a:cs typeface="Arial" panose="020B0604020202020204" pitchFamily="34" charset="0"/>
-              </a:rPr>
-              <a:t>smell</a:t>
-            </a:r>
-            <a:r>
-              <a:rPr lang="pt-BR" sz="2400" dirty="0">
-                <a:latin typeface="Arial" panose="020B0604020202020204" pitchFamily="34" charset="0"/>
-                <a:cs typeface="Arial" panose="020B0604020202020204" pitchFamily="34" charset="0"/>
-              </a:rPr>
-              <a:t> é qualquer sintoma no código fonte que indica um problema mais profundo.</a:t>
+              <a:t>é qualquer sintoma no código fonte que indica um problema mais profundo.</a:t>
             </a:r>
           </a:p>
           <a:p>
@@ -8904,32 +9025,39 @@
               <a:t> em etapas pequenas e controladas, e o design resultante é examinado para verificar se há mais </a:t>
             </a:r>
             <a:r>
-              <a:rPr lang="pt-BR" sz="2400" dirty="0" err="1">
+              <a:rPr lang="pt-BR" sz="2400" b="1" dirty="0" err="1">
                 <a:latin typeface="Arial" panose="020B0604020202020204" pitchFamily="34" charset="0"/>
                 <a:cs typeface="Arial" panose="020B0604020202020204" pitchFamily="34" charset="0"/>
               </a:rPr>
               <a:t>code</a:t>
             </a:r>
             <a:r>
+              <a:rPr lang="pt-BR" sz="2400" b="1" dirty="0">
+                <a:latin typeface="Arial" panose="020B0604020202020204" pitchFamily="34" charset="0"/>
+                <a:cs typeface="Arial" panose="020B0604020202020204" pitchFamily="34" charset="0"/>
+              </a:rPr>
+              <a:t> </a:t>
+            </a:r>
+            <a:r>
+              <a:rPr lang="pt-BR" sz="2400" b="1" dirty="0" err="1">
+                <a:latin typeface="Arial" panose="020B0604020202020204" pitchFamily="34" charset="0"/>
+                <a:cs typeface="Arial" panose="020B0604020202020204" pitchFamily="34" charset="0"/>
+              </a:rPr>
+              <a:t>smells</a:t>
+            </a:r>
+            <a:r>
+              <a:rPr lang="pt-BR" sz="2400" b="1" dirty="0">
+                <a:latin typeface="Arial" panose="020B0604020202020204" pitchFamily="34" charset="0"/>
+                <a:cs typeface="Arial" panose="020B0604020202020204" pitchFamily="34" charset="0"/>
+              </a:rPr>
+              <a:t> </a:t>
+            </a:r>
+            <a:r>
               <a:rPr lang="pt-BR" sz="2400" dirty="0">
                 <a:latin typeface="Arial" panose="020B0604020202020204" pitchFamily="34" charset="0"/>
                 <a:cs typeface="Arial" panose="020B0604020202020204" pitchFamily="34" charset="0"/>
               </a:rPr>
-              <a:t> </a:t>
-            </a:r>
-            <a:r>
-              <a:rPr lang="pt-BR" sz="2400" dirty="0" err="1">
-                <a:latin typeface="Arial" panose="020B0604020202020204" pitchFamily="34" charset="0"/>
-                <a:cs typeface="Arial" panose="020B0604020202020204" pitchFamily="34" charset="0"/>
-              </a:rPr>
-              <a:t>smells</a:t>
-            </a:r>
-            <a:r>
-              <a:rPr lang="pt-BR" sz="2400" dirty="0">
-                <a:latin typeface="Arial" panose="020B0604020202020204" pitchFamily="34" charset="0"/>
-                <a:cs typeface="Arial" panose="020B0604020202020204" pitchFamily="34" charset="0"/>
-              </a:rPr>
-              <a:t> que indiquem a necessidade de mais </a:t>
+              <a:t>que indiquem a necessidade de mais </a:t>
             </a:r>
             <a:r>
               <a:rPr lang="pt-BR" sz="2400" dirty="0" err="1">
@@ -9633,32 +9761,39 @@
               <a:buNone/>
             </a:pPr>
             <a:r>
-              <a:rPr lang="pt-BR" sz="2400" dirty="0" err="1">
+              <a:rPr lang="pt-BR" sz="2400" b="1" dirty="0" err="1">
                 <a:latin typeface="Arial" panose="020B0604020202020204" pitchFamily="34" charset="0"/>
                 <a:cs typeface="Arial" panose="020B0604020202020204" pitchFamily="34" charset="0"/>
               </a:rPr>
               <a:t>Code</a:t>
             </a:r>
             <a:r>
+              <a:rPr lang="pt-BR" sz="2400" b="1" dirty="0">
+                <a:latin typeface="Arial" panose="020B0604020202020204" pitchFamily="34" charset="0"/>
+                <a:cs typeface="Arial" panose="020B0604020202020204" pitchFamily="34" charset="0"/>
+              </a:rPr>
+              <a:t> </a:t>
+            </a:r>
+            <a:r>
+              <a:rPr lang="pt-BR" sz="2400" b="1" dirty="0" err="1">
+                <a:latin typeface="Arial" panose="020B0604020202020204" pitchFamily="34" charset="0"/>
+                <a:cs typeface="Arial" panose="020B0604020202020204" pitchFamily="34" charset="0"/>
+              </a:rPr>
+              <a:t>smells</a:t>
+            </a:r>
+            <a:r>
+              <a:rPr lang="pt-BR" sz="2400" b="1" dirty="0">
+                <a:latin typeface="Arial" panose="020B0604020202020204" pitchFamily="34" charset="0"/>
+                <a:cs typeface="Arial" panose="020B0604020202020204" pitchFamily="34" charset="0"/>
+              </a:rPr>
+              <a:t> </a:t>
+            </a:r>
+            <a:r>
               <a:rPr lang="pt-BR" sz="2400" dirty="0">
                 <a:latin typeface="Arial" panose="020B0604020202020204" pitchFamily="34" charset="0"/>
                 <a:cs typeface="Arial" panose="020B0604020202020204" pitchFamily="34" charset="0"/>
               </a:rPr>
-              <a:t> </a:t>
-            </a:r>
-            <a:r>
-              <a:rPr lang="pt-BR" sz="2400" dirty="0" err="1">
-                <a:latin typeface="Arial" panose="020B0604020202020204" pitchFamily="34" charset="0"/>
-                <a:cs typeface="Arial" panose="020B0604020202020204" pitchFamily="34" charset="0"/>
-              </a:rPr>
-              <a:t>smells</a:t>
-            </a:r>
-            <a:r>
-              <a:rPr lang="pt-BR" sz="2400" dirty="0">
-                <a:latin typeface="Arial" panose="020B0604020202020204" pitchFamily="34" charset="0"/>
-                <a:cs typeface="Arial" panose="020B0604020202020204" pitchFamily="34" charset="0"/>
-              </a:rPr>
-              <a:t> são heurísticas que indicam quando </a:t>
+              <a:t>são heurísticas que indicam quando </a:t>
             </a:r>
             <a:r>
               <a:rPr lang="pt-BR" sz="2400" dirty="0" err="1">
@@ -9700,32 +9835,39 @@
               </a:rPr>
             </a:br>
             <a:r>
-              <a:rPr lang="pt-BR" sz="2400" dirty="0" err="1">
+              <a:rPr lang="pt-BR" sz="2400" b="1" dirty="0" err="1">
                 <a:latin typeface="Arial" panose="020B0604020202020204" pitchFamily="34" charset="0"/>
                 <a:cs typeface="Arial" panose="020B0604020202020204" pitchFamily="34" charset="0"/>
               </a:rPr>
               <a:t>Code</a:t>
             </a:r>
             <a:r>
+              <a:rPr lang="pt-BR" sz="2400" b="1" dirty="0">
+                <a:latin typeface="Arial" panose="020B0604020202020204" pitchFamily="34" charset="0"/>
+                <a:cs typeface="Arial" panose="020B0604020202020204" pitchFamily="34" charset="0"/>
+              </a:rPr>
+              <a:t> </a:t>
+            </a:r>
+            <a:r>
+              <a:rPr lang="pt-BR" sz="2400" b="1" dirty="0" err="1">
+                <a:latin typeface="Arial" panose="020B0604020202020204" pitchFamily="34" charset="0"/>
+                <a:cs typeface="Arial" panose="020B0604020202020204" pitchFamily="34" charset="0"/>
+              </a:rPr>
+              <a:t>smell</a:t>
+            </a:r>
+            <a:r>
+              <a:rPr lang="pt-BR" sz="2400" b="1" dirty="0">
+                <a:latin typeface="Arial" panose="020B0604020202020204" pitchFamily="34" charset="0"/>
+                <a:cs typeface="Arial" panose="020B0604020202020204" pitchFamily="34" charset="0"/>
+              </a:rPr>
+              <a:t> </a:t>
+            </a:r>
+            <a:r>
               <a:rPr lang="pt-BR" sz="2400" dirty="0">
                 <a:latin typeface="Arial" panose="020B0604020202020204" pitchFamily="34" charset="0"/>
                 <a:cs typeface="Arial" panose="020B0604020202020204" pitchFamily="34" charset="0"/>
               </a:rPr>
-              <a:t> </a:t>
-            </a:r>
-            <a:r>
-              <a:rPr lang="pt-BR" sz="2400" dirty="0" err="1">
-                <a:latin typeface="Arial" panose="020B0604020202020204" pitchFamily="34" charset="0"/>
-                <a:cs typeface="Arial" panose="020B0604020202020204" pitchFamily="34" charset="0"/>
-              </a:rPr>
-              <a:t>smell</a:t>
-            </a:r>
-            <a:r>
-              <a:rPr lang="pt-BR" sz="2400" dirty="0">
-                <a:latin typeface="Arial" panose="020B0604020202020204" pitchFamily="34" charset="0"/>
-                <a:cs typeface="Arial" panose="020B0604020202020204" pitchFamily="34" charset="0"/>
-              </a:rPr>
-              <a:t> é sempre um julgamento subjetivo, e sempre irá variar de acordo com a linguagem de programação, o desenvolvedor e a metodologia de desenvolvimento.</a:t>
+              <a:t>é sempre um julgamento subjetivo, e sempre irá variar de acordo com a linguagem de programação, o desenvolvedor e a metodologia de desenvolvimento.</a:t>
             </a:r>
           </a:p>
           <a:p>
@@ -10549,7 +10691,7 @@
               <a:t>Em Desenvolvimento de software o termo </a:t>
             </a:r>
             <a:r>
-              <a:rPr lang="pt-BR" sz="2200" dirty="0" err="1">
+              <a:rPr lang="pt-BR" sz="2200" b="1" dirty="0" err="1">
                 <a:solidFill>
                   <a:schemeClr val="tx1"/>
                 </a:solidFill>
@@ -10560,7 +10702,7 @@
               <a:t>Code</a:t>
             </a:r>
             <a:r>
-              <a:rPr lang="pt-BR" sz="2200" dirty="0">
+              <a:rPr lang="pt-BR" sz="2200" b="1" dirty="0">
                 <a:solidFill>
                   <a:schemeClr val="tx1"/>
                 </a:solidFill>
@@ -10571,7 +10713,7 @@
               <a:t> </a:t>
             </a:r>
             <a:r>
-              <a:rPr lang="pt-BR" sz="2200" dirty="0" err="1">
+              <a:rPr lang="pt-BR" sz="2200" b="1" dirty="0" err="1">
                 <a:solidFill>
                   <a:schemeClr val="tx1"/>
                 </a:solidFill>
@@ -11336,10 +11478,10 @@
                 <a:cs typeface="Arial" panose="020B0604020202020204" pitchFamily="34" charset="0"/>
                 <a:sym typeface="+mn-ea"/>
               </a:rPr>
-              <a:t>Na verdade o </a:t>
-            </a:r>
-            <a:r>
-              <a:rPr lang="pt-BR" dirty="0" err="1">
+              <a:t>Na verdade </a:t>
+            </a:r>
+            <a:r>
+              <a:rPr lang="pt-BR" b="1" dirty="0">
                 <a:solidFill>
                   <a:schemeClr val="tx1"/>
                 </a:solidFill>
@@ -11347,9 +11489,53 @@
                 <a:cs typeface="Arial" panose="020B0604020202020204" pitchFamily="34" charset="0"/>
                 <a:sym typeface="+mn-ea"/>
               </a:rPr>
+              <a:t>o </a:t>
+            </a:r>
+            <a:r>
+              <a:rPr lang="pt-BR" b="1" dirty="0" err="1">
+                <a:solidFill>
+                  <a:schemeClr val="tx1"/>
+                </a:solidFill>
+                <a:latin typeface="Arial" panose="020B0604020202020204" pitchFamily="34" charset="0"/>
+                <a:cs typeface="Arial" panose="020B0604020202020204" pitchFamily="34" charset="0"/>
+                <a:sym typeface="+mn-ea"/>
+              </a:rPr>
               <a:t>Code</a:t>
             </a:r>
             <a:r>
+              <a:rPr lang="pt-BR" b="1" dirty="0">
+                <a:solidFill>
+                  <a:schemeClr val="tx1"/>
+                </a:solidFill>
+                <a:latin typeface="Arial" panose="020B0604020202020204" pitchFamily="34" charset="0"/>
+                <a:cs typeface="Arial" panose="020B0604020202020204" pitchFamily="34" charset="0"/>
+                <a:sym typeface="+mn-ea"/>
+              </a:rPr>
+              <a:t> </a:t>
+            </a:r>
+            <a:r>
+              <a:rPr lang="pt-BR" b="1" dirty="0" err="1">
+                <a:solidFill>
+                  <a:schemeClr val="tx1"/>
+                </a:solidFill>
+                <a:latin typeface="Arial" panose="020B0604020202020204" pitchFamily="34" charset="0"/>
+                <a:cs typeface="Arial" panose="020B0604020202020204" pitchFamily="34" charset="0"/>
+                <a:sym typeface="+mn-ea"/>
+              </a:rPr>
+              <a:t>Smell</a:t>
+            </a:r>
+            <a:r>
+              <a:rPr lang="pt-BR" b="1" dirty="0">
+                <a:solidFill>
+                  <a:schemeClr val="tx1"/>
+                </a:solidFill>
+                <a:latin typeface="Arial" panose="020B0604020202020204" pitchFamily="34" charset="0"/>
+                <a:cs typeface="Arial" panose="020B0604020202020204" pitchFamily="34" charset="0"/>
+                <a:sym typeface="+mn-ea"/>
+              </a:rPr>
+              <a:t> </a:t>
+            </a:r>
+            <a:r>
               <a:rPr lang="pt-BR" dirty="0">
                 <a:solidFill>
                   <a:schemeClr val="tx1"/>
@@ -11358,10 +11544,10 @@
                 <a:cs typeface="Arial" panose="020B0604020202020204" pitchFamily="34" charset="0"/>
                 <a:sym typeface="+mn-ea"/>
               </a:rPr>
-              <a:t> </a:t>
-            </a:r>
-            <a:r>
-              <a:rPr lang="pt-BR" dirty="0" err="1">
+              <a:t>indica que o projeto de software não foi bem feito e que vai apresentar uma </a:t>
+            </a:r>
+            <a:r>
+              <a:rPr lang="pt-BR" b="1" dirty="0">
                 <a:solidFill>
                   <a:schemeClr val="tx1"/>
                 </a:solidFill>
@@ -11369,7 +11555,7 @@
                 <a:cs typeface="Arial" panose="020B0604020202020204" pitchFamily="34" charset="0"/>
                 <a:sym typeface="+mn-ea"/>
               </a:rPr>
-              <a:t>Smell</a:t>
+              <a:t>alta taxa de manutenção com riscos </a:t>
             </a:r>
             <a:r>
               <a:rPr lang="pt-BR" dirty="0">
@@ -11380,7 +11566,29 @@
                 <a:cs typeface="Arial" panose="020B0604020202020204" pitchFamily="34" charset="0"/>
                 <a:sym typeface="+mn-ea"/>
               </a:rPr>
-              <a:t> indica que o projeto de software não foi bem feito e que vai apresentar uma alta taxa de manutenção com riscos de apresentar bugs catastróficos no futuro.</a:t>
+              <a:t>de </a:t>
+            </a:r>
+            <a:r>
+              <a:rPr lang="pt-BR" b="1" dirty="0">
+                <a:solidFill>
+                  <a:srgbClr val="FF0000"/>
+                </a:solidFill>
+                <a:latin typeface="Arial" panose="020B0604020202020204" pitchFamily="34" charset="0"/>
+                <a:cs typeface="Arial" panose="020B0604020202020204" pitchFamily="34" charset="0"/>
+                <a:sym typeface="+mn-ea"/>
+              </a:rPr>
+              <a:t>apresentar bugs catastróficos no futuro</a:t>
+            </a:r>
+            <a:r>
+              <a:rPr lang="pt-BR" dirty="0">
+                <a:solidFill>
+                  <a:schemeClr val="tx1"/>
+                </a:solidFill>
+                <a:latin typeface="Arial" panose="020B0604020202020204" pitchFamily="34" charset="0"/>
+                <a:cs typeface="Arial" panose="020B0604020202020204" pitchFamily="34" charset="0"/>
+                <a:sym typeface="+mn-ea"/>
+              </a:rPr>
+              <a:t>.</a:t>
             </a:r>
           </a:p>
           <a:p>
@@ -15346,15 +15554,15 @@
               <a:t> uma classe que acabou ficando muito extensa (</a:t>
             </a:r>
             <a:r>
-              <a:rPr lang="pt-BR" sz="2400" dirty="0" err="1"/>
+              <a:rPr lang="pt-BR" sz="2400" b="1" dirty="0" err="1"/>
               <a:t>God</a:t>
             </a:r>
             <a:r>
-              <a:rPr lang="pt-BR" sz="2400" dirty="0"/>
+              <a:rPr lang="pt-BR" sz="2400" b="1" dirty="0"/>
               <a:t> </a:t>
             </a:r>
             <a:r>
-              <a:rPr lang="pt-BR" sz="2400" dirty="0" err="1"/>
+              <a:rPr lang="pt-BR" sz="2400" b="1" dirty="0" err="1"/>
               <a:t>Object</a:t>
             </a:r>
             <a:r>
@@ -17900,17 +18108,61 @@
                 <a:cs typeface="Arial" panose="020B0604020202020204" pitchFamily="34" charset="0"/>
                 <a:sym typeface="+mn-ea"/>
               </a:rPr>
-              <a:t> Devemos aumentar o reuso, substituindo procedimentos por configuração e evitando “reinventar a roda”; </a:t>
+              <a:t> Devemos aumentar o reuso, </a:t>
             </a:r>
             <a:r>
               <a:rPr lang="pt-BR" sz="2200" b="1" dirty="0">
                 <a:solidFill>
+                  <a:srgbClr val="FF0000"/>
+                </a:solidFill>
+                <a:latin typeface="Arial" panose="020B0604020202020204" pitchFamily="34" charset="0"/>
+                <a:cs typeface="Arial" panose="020B0604020202020204" pitchFamily="34" charset="0"/>
+                <a:sym typeface="+mn-ea"/>
+              </a:rPr>
+              <a:t>substituindo</a:t>
+            </a:r>
+            <a:r>
+              <a:rPr lang="pt-BR" sz="2200" dirty="0">
+                <a:solidFill>
                   <a:schemeClr val="tx1"/>
                 </a:solidFill>
                 <a:latin typeface="Arial" panose="020B0604020202020204" pitchFamily="34" charset="0"/>
                 <a:cs typeface="Arial" panose="020B0604020202020204" pitchFamily="34" charset="0"/>
                 <a:sym typeface="+mn-ea"/>
               </a:rPr>
+              <a:t> procedimentos por abstrações, configuração e evitando “</a:t>
+            </a:r>
+            <a:r>
+              <a:rPr lang="pt-BR" sz="2200" b="1" dirty="0">
+                <a:solidFill>
+                  <a:schemeClr val="tx1"/>
+                </a:solidFill>
+                <a:latin typeface="Arial" panose="020B0604020202020204" pitchFamily="34" charset="0"/>
+                <a:cs typeface="Arial" panose="020B0604020202020204" pitchFamily="34" charset="0"/>
+                <a:sym typeface="+mn-ea"/>
+              </a:rPr>
+              <a:t>reinventar a roda</a:t>
+            </a:r>
+            <a:r>
+              <a:rPr lang="pt-BR" sz="2200" dirty="0">
+                <a:solidFill>
+                  <a:schemeClr val="tx1"/>
+                </a:solidFill>
+                <a:latin typeface="Arial" panose="020B0604020202020204" pitchFamily="34" charset="0"/>
+                <a:cs typeface="Arial" panose="020B0604020202020204" pitchFamily="34" charset="0"/>
+                <a:sym typeface="+mn-ea"/>
+              </a:rPr>
+              <a:t>”; </a:t>
+            </a:r>
+            <a:r>
+              <a:rPr lang="pt-BR" sz="2200" b="1" dirty="0">
+                <a:solidFill>
+                  <a:schemeClr val="tx1"/>
+                </a:solidFill>
+                <a:latin typeface="Arial" panose="020B0604020202020204" pitchFamily="34" charset="0"/>
+                <a:cs typeface="Arial" panose="020B0604020202020204" pitchFamily="34" charset="0"/>
+                <a:sym typeface="+mn-ea"/>
+              </a:rPr>
               <a:t>(DRY – </a:t>
             </a:r>
             <a:r>
@@ -17969,7 +18221,7 @@
               <a:t>yourself</a:t>
             </a:r>
             <a:r>
-              <a:rPr lang="pt-BR" sz="2200" b="1" dirty="0">
+              <a:rPr lang="pt-BR" sz="2200" b="1">
                 <a:solidFill>
                   <a:schemeClr val="tx1"/>
                 </a:solidFill>
@@ -17977,8 +18229,16 @@
                 <a:cs typeface="Arial" panose="020B0604020202020204" pitchFamily="34" charset="0"/>
                 <a:sym typeface="+mn-ea"/>
               </a:rPr>
-              <a:t>)</a:t>
-            </a:r>
+              <a:t>).</a:t>
+            </a:r>
+            <a:endParaRPr lang="pt-BR" sz="2200" b="1" dirty="0">
+              <a:solidFill>
+                <a:schemeClr val="tx1"/>
+              </a:solidFill>
+              <a:latin typeface="Arial" panose="020B0604020202020204" pitchFamily="34" charset="0"/>
+              <a:cs typeface="Arial" panose="020B0604020202020204" pitchFamily="34" charset="0"/>
+              <a:sym typeface="+mn-ea"/>
+            </a:endParaRPr>
           </a:p>
           <a:p>
             <a:pPr marL="0" indent="0" algn="just" hangingPunct="1">
@@ -22137,39 +22397,23 @@
                   <a:srgbClr val="0070C0"/>
                 </a:solidFill>
               </a:rPr>
-              <a:t>Code Smell	</a:t>
-            </a:r>
-          </a:p>
-        </p:txBody>
-      </p:sp>
-      <p:sp>
-        <p:nvSpPr>
-          <p:cNvPr id="8" name="Text Placeholder 2"/>
-          <p:cNvSpPr>
-            <a:spLocks noGrp="1"/>
-          </p:cNvSpPr>
-          <p:nvPr>
-            <p:ph type="body" sz="half" idx="1"/>
-          </p:nvPr>
-        </p:nvSpPr>
-        <p:spPr>
-          <a:xfrm>
-            <a:off x="157152" y="1200150"/>
-            <a:ext cx="8815396" cy="3611166"/>
-          </a:xfrm>
-        </p:spPr>
-        <p:txBody>
-          <a:bodyPr>
-            <a:noAutofit/>
-          </a:bodyPr>
-          <a:lstStyle/>
-          <a:p>
-            <a:pPr marL="0" indent="0" algn="just">
-              <a:buNone/>
-            </a:pPr>
-            <a:r>
-              <a:rPr lang="pt-BR" sz="2400" dirty="0"/>
-              <a:t>	</a:t>
+              <a:t>Tools de </a:t>
+            </a:r>
+            <a:r>
+              <a:rPr lang="en-US" b="1" dirty="0" err="1">
+                <a:solidFill>
+                  <a:srgbClr val="0070C0"/>
+                </a:solidFill>
+              </a:rPr>
+              <a:t>Detecção</a:t>
+            </a:r>
+            <a:r>
+              <a:rPr lang="en-US" b="1" dirty="0">
+                <a:solidFill>
+                  <a:srgbClr val="0070C0"/>
+                </a:solidFill>
+              </a:rPr>
+              <a:t> - Code Smell	</a:t>
             </a:r>
           </a:p>
         </p:txBody>
@@ -22475,6 +22719,759 @@
         <p:spPr>
           <a:xfrm>
             <a:off x="404800" y="1001841"/>
+            <a:ext cx="8572500" cy="3935680"/>
+          </a:xfrm>
+          <a:prstGeom prst="rect">
+            <a:avLst/>
+          </a:prstGeom>
+          <a:ln w="12700">
+            <a:miter lim="400000"/>
+          </a:ln>
+        </p:spPr>
+        <p:txBody>
+          <a:bodyPr lIns="45718" tIns="45718" rIns="45718" bIns="45718">
+            <a:noAutofit/>
+          </a:bodyPr>
+          <a:lstStyle>
+            <a:lvl1pPr marL="342900" marR="0" indent="-342900" algn="l" defTabSz="457200" rtl="0" latinLnBrk="0">
+              <a:lnSpc>
+                <a:spcPct val="100000"/>
+              </a:lnSpc>
+              <a:spcBef>
+                <a:spcPts val="600"/>
+              </a:spcBef>
+              <a:spcAft>
+                <a:spcPts val="0"/>
+              </a:spcAft>
+              <a:buClrTx/>
+              <a:buSzPct val="100000"/>
+              <a:buFont typeface="Arial" panose="020B0604020202020204"/>
+              <a:buChar char="•"/>
+              <a:defRPr sz="2800" b="0" i="0" u="none" strike="noStrike" cap="none" spc="0" baseline="0">
+                <a:ln>
+                  <a:noFill/>
+                </a:ln>
+                <a:solidFill>
+                  <a:srgbClr val="000000"/>
+                </a:solidFill>
+                <a:uFillTx/>
+                <a:latin typeface="+mj-lt"/>
+                <a:ea typeface="+mj-ea"/>
+                <a:cs typeface="+mj-cs"/>
+                <a:sym typeface="Calibri"/>
+              </a:defRPr>
+            </a:lvl1pPr>
+            <a:lvl2pPr marL="790575" marR="0" indent="-333375" algn="l" defTabSz="457200" rtl="0" latinLnBrk="0">
+              <a:lnSpc>
+                <a:spcPct val="100000"/>
+              </a:lnSpc>
+              <a:spcBef>
+                <a:spcPts val="600"/>
+              </a:spcBef>
+              <a:spcAft>
+                <a:spcPts val="0"/>
+              </a:spcAft>
+              <a:buClrTx/>
+              <a:buSzPct val="100000"/>
+              <a:buFont typeface="Arial" panose="020B0604020202020204"/>
+              <a:buChar char="–"/>
+              <a:defRPr sz="2800" b="0" i="0" u="none" strike="noStrike" cap="none" spc="0" baseline="0">
+                <a:ln>
+                  <a:noFill/>
+                </a:ln>
+                <a:solidFill>
+                  <a:srgbClr val="000000"/>
+                </a:solidFill>
+                <a:uFillTx/>
+                <a:latin typeface="+mj-lt"/>
+                <a:ea typeface="+mj-ea"/>
+                <a:cs typeface="+mj-cs"/>
+                <a:sym typeface="Calibri"/>
+              </a:defRPr>
+            </a:lvl2pPr>
+            <a:lvl3pPr marL="1234440" marR="0" indent="-320040" algn="l" defTabSz="457200" rtl="0" latinLnBrk="0">
+              <a:lnSpc>
+                <a:spcPct val="100000"/>
+              </a:lnSpc>
+              <a:spcBef>
+                <a:spcPts val="600"/>
+              </a:spcBef>
+              <a:spcAft>
+                <a:spcPts val="0"/>
+              </a:spcAft>
+              <a:buClrTx/>
+              <a:buSzPct val="100000"/>
+              <a:buFont typeface="Arial" panose="020B0604020202020204"/>
+              <a:buChar char="•"/>
+              <a:defRPr sz="2800" b="0" i="0" u="none" strike="noStrike" cap="none" spc="0" baseline="0">
+                <a:ln>
+                  <a:noFill/>
+                </a:ln>
+                <a:solidFill>
+                  <a:srgbClr val="000000"/>
+                </a:solidFill>
+                <a:uFillTx/>
+                <a:latin typeface="+mj-lt"/>
+                <a:ea typeface="+mj-ea"/>
+                <a:cs typeface="+mj-cs"/>
+                <a:sym typeface="Calibri"/>
+              </a:defRPr>
+            </a:lvl3pPr>
+            <a:lvl4pPr marL="1727200" marR="0" indent="-355600" algn="l" defTabSz="457200" rtl="0" latinLnBrk="0">
+              <a:lnSpc>
+                <a:spcPct val="100000"/>
+              </a:lnSpc>
+              <a:spcBef>
+                <a:spcPts val="600"/>
+              </a:spcBef>
+              <a:spcAft>
+                <a:spcPts val="0"/>
+              </a:spcAft>
+              <a:buClrTx/>
+              <a:buSzPct val="100000"/>
+              <a:buFont typeface="Arial" panose="020B0604020202020204"/>
+              <a:buChar char="–"/>
+              <a:defRPr sz="2800" b="0" i="0" u="none" strike="noStrike" cap="none" spc="0" baseline="0">
+                <a:ln>
+                  <a:noFill/>
+                </a:ln>
+                <a:solidFill>
+                  <a:srgbClr val="000000"/>
+                </a:solidFill>
+                <a:uFillTx/>
+                <a:latin typeface="+mj-lt"/>
+                <a:ea typeface="+mj-ea"/>
+                <a:cs typeface="+mj-cs"/>
+                <a:sym typeface="Calibri"/>
+              </a:defRPr>
+            </a:lvl4pPr>
+            <a:lvl5pPr marL="2184400" marR="0" indent="-355600" algn="l" defTabSz="457200" rtl="0" latinLnBrk="0">
+              <a:lnSpc>
+                <a:spcPct val="100000"/>
+              </a:lnSpc>
+              <a:spcBef>
+                <a:spcPts val="600"/>
+              </a:spcBef>
+              <a:spcAft>
+                <a:spcPts val="0"/>
+              </a:spcAft>
+              <a:buClrTx/>
+              <a:buSzPct val="100000"/>
+              <a:buFont typeface="Arial" panose="020B0604020202020204"/>
+              <a:buChar char="»"/>
+              <a:defRPr sz="2800" b="0" i="0" u="none" strike="noStrike" cap="none" spc="0" baseline="0">
+                <a:ln>
+                  <a:noFill/>
+                </a:ln>
+                <a:solidFill>
+                  <a:srgbClr val="000000"/>
+                </a:solidFill>
+                <a:uFillTx/>
+                <a:latin typeface="+mj-lt"/>
+                <a:ea typeface="+mj-ea"/>
+                <a:cs typeface="+mj-cs"/>
+                <a:sym typeface="Calibri"/>
+              </a:defRPr>
+            </a:lvl5pPr>
+            <a:lvl6pPr marL="2651760" marR="0" indent="-365760" algn="l" defTabSz="457200" rtl="0" latinLnBrk="0">
+              <a:lnSpc>
+                <a:spcPct val="100000"/>
+              </a:lnSpc>
+              <a:spcBef>
+                <a:spcPts val="700"/>
+              </a:spcBef>
+              <a:spcAft>
+                <a:spcPts val="0"/>
+              </a:spcAft>
+              <a:buClrTx/>
+              <a:buSzPct val="100000"/>
+              <a:buFont typeface="Arial" panose="020B0604020202020204"/>
+              <a:buChar char="•"/>
+              <a:defRPr sz="3200" b="0" i="0" u="none" strike="noStrike" cap="none" spc="0" baseline="0">
+                <a:ln>
+                  <a:noFill/>
+                </a:ln>
+                <a:solidFill>
+                  <a:srgbClr val="000000"/>
+                </a:solidFill>
+                <a:uFillTx/>
+                <a:latin typeface="+mj-lt"/>
+                <a:ea typeface="+mj-ea"/>
+                <a:cs typeface="+mj-cs"/>
+                <a:sym typeface="Calibri"/>
+              </a:defRPr>
+            </a:lvl6pPr>
+            <a:lvl7pPr marL="3108960" marR="0" indent="-365760" algn="l" defTabSz="457200" rtl="0" latinLnBrk="0">
+              <a:lnSpc>
+                <a:spcPct val="100000"/>
+              </a:lnSpc>
+              <a:spcBef>
+                <a:spcPts val="700"/>
+              </a:spcBef>
+              <a:spcAft>
+                <a:spcPts val="0"/>
+              </a:spcAft>
+              <a:buClrTx/>
+              <a:buSzPct val="100000"/>
+              <a:buFont typeface="Arial" panose="020B0604020202020204"/>
+              <a:buChar char="•"/>
+              <a:defRPr sz="3200" b="0" i="0" u="none" strike="noStrike" cap="none" spc="0" baseline="0">
+                <a:ln>
+                  <a:noFill/>
+                </a:ln>
+                <a:solidFill>
+                  <a:srgbClr val="000000"/>
+                </a:solidFill>
+                <a:uFillTx/>
+                <a:latin typeface="+mj-lt"/>
+                <a:ea typeface="+mj-ea"/>
+                <a:cs typeface="+mj-cs"/>
+                <a:sym typeface="Calibri"/>
+              </a:defRPr>
+            </a:lvl7pPr>
+            <a:lvl8pPr marL="3566160" marR="0" indent="-365760" algn="l" defTabSz="457200" rtl="0" latinLnBrk="0">
+              <a:lnSpc>
+                <a:spcPct val="100000"/>
+              </a:lnSpc>
+              <a:spcBef>
+                <a:spcPts val="700"/>
+              </a:spcBef>
+              <a:spcAft>
+                <a:spcPts val="0"/>
+              </a:spcAft>
+              <a:buClrTx/>
+              <a:buSzPct val="100000"/>
+              <a:buFont typeface="Arial" panose="020B0604020202020204"/>
+              <a:buChar char="•"/>
+              <a:defRPr sz="3200" b="0" i="0" u="none" strike="noStrike" cap="none" spc="0" baseline="0">
+                <a:ln>
+                  <a:noFill/>
+                </a:ln>
+                <a:solidFill>
+                  <a:srgbClr val="000000"/>
+                </a:solidFill>
+                <a:uFillTx/>
+                <a:latin typeface="+mj-lt"/>
+                <a:ea typeface="+mj-ea"/>
+                <a:cs typeface="+mj-cs"/>
+                <a:sym typeface="Calibri"/>
+              </a:defRPr>
+            </a:lvl8pPr>
+            <a:lvl9pPr marL="4023360" marR="0" indent="-365760" algn="l" defTabSz="457200" rtl="0" latinLnBrk="0">
+              <a:lnSpc>
+                <a:spcPct val="100000"/>
+              </a:lnSpc>
+              <a:spcBef>
+                <a:spcPts val="700"/>
+              </a:spcBef>
+              <a:spcAft>
+                <a:spcPts val="0"/>
+              </a:spcAft>
+              <a:buClrTx/>
+              <a:buSzPct val="100000"/>
+              <a:buFont typeface="Arial" panose="020B0604020202020204"/>
+              <a:buChar char="•"/>
+              <a:defRPr sz="3200" b="0" i="0" u="none" strike="noStrike" cap="none" spc="0" baseline="0">
+                <a:ln>
+                  <a:noFill/>
+                </a:ln>
+                <a:solidFill>
+                  <a:srgbClr val="000000"/>
+                </a:solidFill>
+                <a:uFillTx/>
+                <a:latin typeface="+mj-lt"/>
+                <a:ea typeface="+mj-ea"/>
+                <a:cs typeface="+mj-cs"/>
+                <a:sym typeface="Calibri"/>
+              </a:defRPr>
+            </a:lvl9pPr>
+          </a:lstStyle>
+          <a:p>
+            <a:pPr marL="0" indent="0" algn="just" hangingPunct="1">
+              <a:buNone/>
+            </a:pPr>
+            <a:r>
+              <a:rPr lang="pt-BR" b="0" i="0" dirty="0">
+                <a:solidFill>
+                  <a:srgbClr val="303633"/>
+                </a:solidFill>
+                <a:effectLst/>
+                <a:latin typeface="Arial" panose="020B0604020202020204" pitchFamily="34" charset="0"/>
+                <a:cs typeface="Arial" panose="020B0604020202020204" pitchFamily="34" charset="0"/>
+              </a:rPr>
+              <a:t>Existem algumas ferramentas para detecção de </a:t>
+            </a:r>
+            <a:r>
+              <a:rPr lang="pt-BR" b="0" i="0" dirty="0" err="1">
+                <a:solidFill>
+                  <a:srgbClr val="303633"/>
+                </a:solidFill>
+                <a:effectLst/>
+                <a:latin typeface="Arial" panose="020B0604020202020204" pitchFamily="34" charset="0"/>
+                <a:cs typeface="Arial" panose="020B0604020202020204" pitchFamily="34" charset="0"/>
+              </a:rPr>
+              <a:t>code</a:t>
+            </a:r>
+            <a:r>
+              <a:rPr lang="pt-BR" b="0" i="0" dirty="0">
+                <a:solidFill>
+                  <a:srgbClr val="303633"/>
+                </a:solidFill>
+                <a:effectLst/>
+                <a:latin typeface="Arial" panose="020B0604020202020204" pitchFamily="34" charset="0"/>
+                <a:cs typeface="Arial" panose="020B0604020202020204" pitchFamily="34" charset="0"/>
+              </a:rPr>
+              <a:t> </a:t>
+            </a:r>
+            <a:r>
+              <a:rPr lang="pt-BR" b="0" i="0" dirty="0" err="1">
+                <a:solidFill>
+                  <a:srgbClr val="303633"/>
+                </a:solidFill>
+                <a:effectLst/>
+                <a:latin typeface="Arial" panose="020B0604020202020204" pitchFamily="34" charset="0"/>
+                <a:cs typeface="Arial" panose="020B0604020202020204" pitchFamily="34" charset="0"/>
+              </a:rPr>
+              <a:t>smell</a:t>
+            </a:r>
+            <a:r>
+              <a:rPr lang="pt-BR" b="1" i="0" dirty="0">
+                <a:solidFill>
+                  <a:srgbClr val="303633"/>
+                </a:solidFill>
+                <a:effectLst/>
+                <a:latin typeface="Arial" panose="020B0604020202020204" pitchFamily="34" charset="0"/>
+                <a:cs typeface="Arial" panose="020B0604020202020204" pitchFamily="34" charset="0"/>
+              </a:rPr>
+              <a:t>. </a:t>
+            </a:r>
+          </a:p>
+          <a:p>
+            <a:pPr marL="0" indent="0" algn="just" hangingPunct="1">
+              <a:buNone/>
+            </a:pPr>
+            <a:endParaRPr lang="pt-BR" dirty="0">
+              <a:solidFill>
+                <a:schemeClr val="tx1"/>
+              </a:solidFill>
+              <a:latin typeface="Arial" panose="020B0604020202020204" pitchFamily="34" charset="0"/>
+              <a:cs typeface="Arial" panose="020B0604020202020204" pitchFamily="34" charset="0"/>
+              <a:sym typeface="+mn-ea"/>
+            </a:endParaRPr>
+          </a:p>
+          <a:p>
+            <a:pPr algn="just" hangingPunct="1">
+              <a:buFont typeface="Wingdings" panose="05000000000000000000" pitchFamily="2" charset="2"/>
+              <a:buChar char="§"/>
+            </a:pPr>
+            <a:r>
+              <a:rPr lang="pt-BR" b="1" dirty="0">
+                <a:solidFill>
+                  <a:schemeClr val="tx1"/>
+                </a:solidFill>
+                <a:latin typeface="Arial" panose="020B0604020202020204" pitchFamily="34" charset="0"/>
+                <a:cs typeface="Arial" panose="020B0604020202020204" pitchFamily="34" charset="0"/>
+                <a:sym typeface="+mn-ea"/>
+              </a:rPr>
+              <a:t>PMD</a:t>
+            </a:r>
+            <a:r>
+              <a:rPr lang="pt-BR" dirty="0">
+                <a:solidFill>
+                  <a:schemeClr val="tx1"/>
+                </a:solidFill>
+                <a:latin typeface="Arial" panose="020B0604020202020204" pitchFamily="34" charset="0"/>
+                <a:cs typeface="Arial" panose="020B0604020202020204" pitchFamily="34" charset="0"/>
+                <a:sym typeface="+mn-ea"/>
+              </a:rPr>
+              <a:t> (Java, Python, C, C++, C#, JS, </a:t>
+            </a:r>
+            <a:r>
+              <a:rPr lang="pt-BR" dirty="0" err="1">
+                <a:solidFill>
+                  <a:schemeClr val="tx1"/>
+                </a:solidFill>
+                <a:latin typeface="Arial" panose="020B0604020202020204" pitchFamily="34" charset="0"/>
+                <a:cs typeface="Arial" panose="020B0604020202020204" pitchFamily="34" charset="0"/>
+                <a:sym typeface="+mn-ea"/>
+              </a:rPr>
+              <a:t>etc</a:t>
+            </a:r>
+            <a:r>
+              <a:rPr lang="pt-BR" dirty="0">
+                <a:solidFill>
+                  <a:schemeClr val="tx1"/>
+                </a:solidFill>
+                <a:latin typeface="Arial" panose="020B0604020202020204" pitchFamily="34" charset="0"/>
+                <a:cs typeface="Arial" panose="020B0604020202020204" pitchFamily="34" charset="0"/>
+                <a:sym typeface="+mn-ea"/>
+              </a:rPr>
+              <a:t>)</a:t>
+            </a:r>
+          </a:p>
+          <a:p>
+            <a:pPr algn="just" hangingPunct="1">
+              <a:buFont typeface="Wingdings" panose="05000000000000000000" pitchFamily="2" charset="2"/>
+              <a:buChar char="§"/>
+            </a:pPr>
+            <a:r>
+              <a:rPr lang="pt-BR" b="1" dirty="0">
+                <a:solidFill>
+                  <a:schemeClr val="tx1"/>
+                </a:solidFill>
+                <a:latin typeface="Arial" panose="020B0604020202020204" pitchFamily="34" charset="0"/>
+                <a:cs typeface="Arial" panose="020B0604020202020204" pitchFamily="34" charset="0"/>
+                <a:sym typeface="+mn-ea"/>
+              </a:rPr>
+              <a:t>Java</a:t>
+            </a:r>
+            <a:r>
+              <a:rPr lang="pt-BR" dirty="0">
+                <a:solidFill>
+                  <a:schemeClr val="tx1"/>
+                </a:solidFill>
+                <a:latin typeface="Arial" panose="020B0604020202020204" pitchFamily="34" charset="0"/>
+                <a:cs typeface="Arial" panose="020B0604020202020204" pitchFamily="34" charset="0"/>
+                <a:sym typeface="+mn-ea"/>
+              </a:rPr>
+              <a:t>: </a:t>
+            </a:r>
+            <a:r>
+              <a:rPr lang="pt-BR" dirty="0" err="1">
+                <a:solidFill>
+                  <a:schemeClr val="tx1"/>
+                </a:solidFill>
+                <a:latin typeface="Arial" panose="020B0604020202020204" pitchFamily="34" charset="0"/>
+                <a:cs typeface="Arial" panose="020B0604020202020204" pitchFamily="34" charset="0"/>
+                <a:sym typeface="+mn-ea"/>
+              </a:rPr>
+              <a:t>Ckeckstyle</a:t>
+            </a:r>
+            <a:r>
+              <a:rPr lang="pt-BR" dirty="0">
+                <a:solidFill>
+                  <a:schemeClr val="tx1"/>
+                </a:solidFill>
+                <a:latin typeface="Arial" panose="020B0604020202020204" pitchFamily="34" charset="0"/>
+                <a:cs typeface="Arial" panose="020B0604020202020204" pitchFamily="34" charset="0"/>
+                <a:sym typeface="+mn-ea"/>
+              </a:rPr>
+              <a:t>, </a:t>
+            </a:r>
+            <a:r>
+              <a:rPr lang="pt-BR" dirty="0" err="1">
+                <a:solidFill>
+                  <a:schemeClr val="tx1"/>
+                </a:solidFill>
+                <a:latin typeface="Arial" panose="020B0604020202020204" pitchFamily="34" charset="0"/>
+                <a:cs typeface="Arial" panose="020B0604020202020204" pitchFamily="34" charset="0"/>
+                <a:sym typeface="+mn-ea"/>
+              </a:rPr>
+              <a:t>FindBugs</a:t>
+            </a:r>
+            <a:endParaRPr lang="pt-BR" dirty="0">
+              <a:solidFill>
+                <a:schemeClr val="tx1"/>
+              </a:solidFill>
+              <a:latin typeface="Arial" panose="020B0604020202020204" pitchFamily="34" charset="0"/>
+              <a:cs typeface="Arial" panose="020B0604020202020204" pitchFamily="34" charset="0"/>
+              <a:sym typeface="+mn-ea"/>
+            </a:endParaRPr>
+          </a:p>
+          <a:p>
+            <a:pPr algn="just" hangingPunct="1">
+              <a:buFont typeface="Wingdings" panose="05000000000000000000" pitchFamily="2" charset="2"/>
+              <a:buChar char="§"/>
+            </a:pPr>
+            <a:r>
+              <a:rPr lang="pt-BR" b="1" dirty="0" err="1">
+                <a:solidFill>
+                  <a:schemeClr val="tx1"/>
+                </a:solidFill>
+                <a:latin typeface="Arial" panose="020B0604020202020204" pitchFamily="34" charset="0"/>
+                <a:cs typeface="Arial" panose="020B0604020202020204" pitchFamily="34" charset="0"/>
+                <a:sym typeface="+mn-ea"/>
+              </a:rPr>
+              <a:t>.Net</a:t>
+            </a:r>
+            <a:r>
+              <a:rPr lang="pt-BR" b="1" dirty="0">
+                <a:solidFill>
+                  <a:schemeClr val="tx1"/>
+                </a:solidFill>
+                <a:latin typeface="Arial" panose="020B0604020202020204" pitchFamily="34" charset="0"/>
+                <a:cs typeface="Arial" panose="020B0604020202020204" pitchFamily="34" charset="0"/>
+                <a:sym typeface="+mn-ea"/>
+              </a:rPr>
+              <a:t> </a:t>
+            </a:r>
+            <a:r>
+              <a:rPr lang="pt-BR" dirty="0">
+                <a:solidFill>
+                  <a:schemeClr val="tx1"/>
+                </a:solidFill>
+                <a:latin typeface="Arial" panose="020B0604020202020204" pitchFamily="34" charset="0"/>
+                <a:cs typeface="Arial" panose="020B0604020202020204" pitchFamily="34" charset="0"/>
+                <a:sym typeface="+mn-ea"/>
+              </a:rPr>
+              <a:t>– </a:t>
+            </a:r>
+            <a:r>
+              <a:rPr lang="pt-BR" dirty="0" err="1">
+                <a:solidFill>
+                  <a:schemeClr val="tx1"/>
+                </a:solidFill>
+                <a:latin typeface="Arial" panose="020B0604020202020204" pitchFamily="34" charset="0"/>
+                <a:cs typeface="Arial" panose="020B0604020202020204" pitchFamily="34" charset="0"/>
+                <a:sym typeface="+mn-ea"/>
+              </a:rPr>
+              <a:t>ReSharper</a:t>
+            </a:r>
+            <a:endParaRPr lang="pt-BR" dirty="0">
+              <a:solidFill>
+                <a:schemeClr val="tx1"/>
+              </a:solidFill>
+              <a:latin typeface="Arial" panose="020B0604020202020204" pitchFamily="34" charset="0"/>
+              <a:cs typeface="Arial" panose="020B0604020202020204" pitchFamily="34" charset="0"/>
+              <a:sym typeface="+mn-ea"/>
+            </a:endParaRPr>
+          </a:p>
+          <a:p>
+            <a:pPr algn="just" hangingPunct="1">
+              <a:buFont typeface="Wingdings" panose="05000000000000000000" pitchFamily="2" charset="2"/>
+              <a:buChar char="§"/>
+            </a:pPr>
+            <a:r>
+              <a:rPr lang="pt-BR" b="1" dirty="0">
+                <a:solidFill>
+                  <a:schemeClr val="tx1"/>
+                </a:solidFill>
+                <a:latin typeface="Arial" panose="020B0604020202020204" pitchFamily="34" charset="0"/>
+                <a:cs typeface="Arial" panose="020B0604020202020204" pitchFamily="34" charset="0"/>
+                <a:sym typeface="+mn-ea"/>
+              </a:rPr>
+              <a:t>PHP</a:t>
+            </a:r>
+            <a:r>
+              <a:rPr lang="pt-BR" dirty="0">
+                <a:solidFill>
+                  <a:schemeClr val="tx1"/>
+                </a:solidFill>
+                <a:latin typeface="Arial" panose="020B0604020202020204" pitchFamily="34" charset="0"/>
+                <a:cs typeface="Arial" panose="020B0604020202020204" pitchFamily="34" charset="0"/>
+                <a:sym typeface="+mn-ea"/>
+              </a:rPr>
+              <a:t> – PHPMD (</a:t>
+            </a:r>
+            <a:r>
+              <a:rPr lang="pt-BR" b="1" dirty="0">
+                <a:solidFill>
+                  <a:srgbClr val="FF0000"/>
+                </a:solidFill>
+                <a:latin typeface="Arial" panose="020B0604020202020204" pitchFamily="34" charset="0"/>
+                <a:cs typeface="Arial" panose="020B0604020202020204" pitchFamily="34" charset="0"/>
+                <a:sym typeface="+mn-ea"/>
+              </a:rPr>
+              <a:t>PHP </a:t>
+            </a:r>
+            <a:r>
+              <a:rPr lang="pt-BR" b="1" dirty="0" err="1">
+                <a:solidFill>
+                  <a:srgbClr val="FF0000"/>
+                </a:solidFill>
+                <a:latin typeface="Arial" panose="020B0604020202020204" pitchFamily="34" charset="0"/>
+                <a:cs typeface="Arial" panose="020B0604020202020204" pitchFamily="34" charset="0"/>
+                <a:sym typeface="+mn-ea"/>
+              </a:rPr>
+              <a:t>Mess</a:t>
+            </a:r>
+            <a:r>
+              <a:rPr lang="pt-BR" b="1" dirty="0">
+                <a:solidFill>
+                  <a:srgbClr val="FF0000"/>
+                </a:solidFill>
+                <a:latin typeface="Arial" panose="020B0604020202020204" pitchFamily="34" charset="0"/>
+                <a:cs typeface="Arial" panose="020B0604020202020204" pitchFamily="34" charset="0"/>
+                <a:sym typeface="+mn-ea"/>
+              </a:rPr>
+              <a:t> Detector</a:t>
+            </a:r>
+            <a:r>
+              <a:rPr lang="pt-BR" dirty="0">
+                <a:solidFill>
+                  <a:schemeClr val="tx1"/>
+                </a:solidFill>
+                <a:latin typeface="Arial" panose="020B0604020202020204" pitchFamily="34" charset="0"/>
+                <a:cs typeface="Arial" panose="020B0604020202020204" pitchFamily="34" charset="0"/>
+                <a:sym typeface="+mn-ea"/>
+              </a:rPr>
+              <a:t>)</a:t>
+            </a:r>
+          </a:p>
+          <a:p>
+            <a:pPr algn="just" hangingPunct="1">
+              <a:buFont typeface="Wingdings" panose="05000000000000000000" pitchFamily="2" charset="2"/>
+              <a:buChar char="§"/>
+            </a:pPr>
+            <a:r>
+              <a:rPr lang="pt-BR" b="1" dirty="0" err="1">
+                <a:solidFill>
+                  <a:schemeClr val="tx1"/>
+                </a:solidFill>
+                <a:latin typeface="Arial" panose="020B0604020202020204" pitchFamily="34" charset="0"/>
+                <a:cs typeface="Arial" panose="020B0604020202020204" pitchFamily="34" charset="0"/>
+                <a:sym typeface="+mn-ea"/>
+              </a:rPr>
+              <a:t>Dev</a:t>
+            </a:r>
+            <a:r>
+              <a:rPr lang="pt-BR" b="1" dirty="0">
+                <a:solidFill>
+                  <a:schemeClr val="tx1"/>
+                </a:solidFill>
+                <a:latin typeface="Arial" panose="020B0604020202020204" pitchFamily="34" charset="0"/>
+                <a:cs typeface="Arial" panose="020B0604020202020204" pitchFamily="34" charset="0"/>
+                <a:sym typeface="+mn-ea"/>
+              </a:rPr>
+              <a:t> iniciante, </a:t>
+            </a:r>
+            <a:r>
+              <a:rPr lang="pt-BR" b="1" dirty="0" err="1">
+                <a:solidFill>
+                  <a:schemeClr val="tx1"/>
+                </a:solidFill>
+                <a:latin typeface="Arial" panose="020B0604020202020204" pitchFamily="34" charset="0"/>
+                <a:cs typeface="Arial" panose="020B0604020202020204" pitchFamily="34" charset="0"/>
+                <a:sym typeface="+mn-ea"/>
+              </a:rPr>
+              <a:t>Code</a:t>
+            </a:r>
+            <a:r>
+              <a:rPr lang="pt-BR" b="1" dirty="0">
+                <a:solidFill>
+                  <a:schemeClr val="tx1"/>
+                </a:solidFill>
+                <a:latin typeface="Arial" panose="020B0604020202020204" pitchFamily="34" charset="0"/>
+                <a:cs typeface="Arial" panose="020B0604020202020204" pitchFamily="34" charset="0"/>
+                <a:sym typeface="+mn-ea"/>
+              </a:rPr>
+              <a:t> </a:t>
+            </a:r>
+            <a:r>
+              <a:rPr lang="pt-BR" b="1" dirty="0" err="1">
+                <a:solidFill>
+                  <a:schemeClr val="tx1"/>
+                </a:solidFill>
+                <a:latin typeface="Arial" panose="020B0604020202020204" pitchFamily="34" charset="0"/>
+                <a:cs typeface="Arial" panose="020B0604020202020204" pitchFamily="34" charset="0"/>
+                <a:sym typeface="+mn-ea"/>
+              </a:rPr>
+              <a:t>Smell</a:t>
+            </a:r>
+            <a:r>
+              <a:rPr lang="pt-BR" b="1" dirty="0">
+                <a:solidFill>
+                  <a:schemeClr val="tx1"/>
+                </a:solidFill>
+                <a:latin typeface="Arial" panose="020B0604020202020204" pitchFamily="34" charset="0"/>
+                <a:cs typeface="Arial" panose="020B0604020202020204" pitchFamily="34" charset="0"/>
+                <a:sym typeface="+mn-ea"/>
+              </a:rPr>
+              <a:t> da semana</a:t>
+            </a:r>
+          </a:p>
+        </p:txBody>
+      </p:sp>
+    </p:spTree>
+  </p:cSld>
+  <p:clrMapOvr>
+    <a:masterClrMapping/>
+  </p:clrMapOvr>
+  <p:transition spd="med"/>
+</p:sld>
+</file>
+
+<file path=ppt/slides/slide39.xml><?xml version="1.0" encoding="utf-8"?>
+<p:sld xmlns:a="http://schemas.openxmlformats.org/drawingml/2006/main" xmlns:r="http://schemas.openxmlformats.org/officeDocument/2006/relationships" xmlns:p="http://schemas.openxmlformats.org/presentationml/2006/main">
+  <p:cSld>
+    <p:spTree>
+      <p:nvGrpSpPr>
+        <p:cNvPr id="1" name=""/>
+        <p:cNvGrpSpPr/>
+        <p:nvPr/>
+      </p:nvGrpSpPr>
+      <p:grpSpPr>
+        <a:xfrm>
+          <a:off x="0" y="0"/>
+          <a:ext cx="0" cy="0"/>
+          <a:chOff x="0" y="0"/>
+          <a:chExt cx="0" cy="0"/>
+        </a:xfrm>
+      </p:grpSpPr>
+      <p:sp>
+        <p:nvSpPr>
+          <p:cNvPr id="6" name="Title 1"/>
+          <p:cNvSpPr>
+            <a:spLocks noGrp="1"/>
+          </p:cNvSpPr>
+          <p:nvPr>
+            <p:ph type="title"/>
+          </p:nvPr>
+        </p:nvSpPr>
+        <p:spPr>
+          <a:xfrm>
+            <a:off x="457200" y="205979"/>
+            <a:ext cx="8229600" cy="857251"/>
+          </a:xfrm>
+        </p:spPr>
+        <p:txBody>
+          <a:bodyPr/>
+          <a:lstStyle/>
+          <a:p>
+            <a:r>
+              <a:rPr lang="en-US" b="1" dirty="0" err="1">
+                <a:solidFill>
+                  <a:srgbClr val="0070C0"/>
+                </a:solidFill>
+              </a:rPr>
+              <a:t>Leitura</a:t>
+            </a:r>
+            <a:r>
+              <a:rPr lang="en-US" b="1" dirty="0">
+                <a:solidFill>
+                  <a:srgbClr val="0070C0"/>
+                </a:solidFill>
+              </a:rPr>
+              <a:t> </a:t>
+            </a:r>
+            <a:r>
+              <a:rPr lang="en-US" b="1" dirty="0" err="1">
+                <a:solidFill>
+                  <a:srgbClr val="0070C0"/>
+                </a:solidFill>
+              </a:rPr>
+              <a:t>Específica</a:t>
+            </a:r>
+            <a:r>
+              <a:rPr lang="en-US" b="1" dirty="0">
+                <a:solidFill>
+                  <a:srgbClr val="0070C0"/>
+                </a:solidFill>
+              </a:rPr>
+              <a:t> - Code Smell	</a:t>
+            </a:r>
+          </a:p>
+        </p:txBody>
+      </p:sp>
+      <p:sp>
+        <p:nvSpPr>
+          <p:cNvPr id="11" name="Text Placeholder 2"/>
+          <p:cNvSpPr txBox="1"/>
+          <p:nvPr/>
+        </p:nvSpPr>
+        <p:spPr>
+          <a:xfrm>
+            <a:off x="252400" y="887541"/>
             <a:ext cx="8572500" cy="3733924"/>
           </a:xfrm>
           <a:prstGeom prst="rect">
@@ -22744,6 +23741,298 @@
           </a:lstStyle>
           <a:p>
             <a:pPr marL="0" indent="0" algn="just" hangingPunct="1">
+              <a:buFont typeface="Arial" panose="020B0604020202020204"/>
+              <a:buNone/>
+            </a:pPr>
+            <a:endParaRPr lang="pt-BR" sz="2400" dirty="0"/>
+          </a:p>
+          <a:p>
+            <a:pPr marL="0" indent="0" algn="just" hangingPunct="1">
+              <a:buFont typeface="Arial" panose="020B0604020202020204"/>
+              <a:buNone/>
+            </a:pPr>
+            <a:endParaRPr lang="pt-BR" b="1" u="sng" dirty="0"/>
+          </a:p>
+        </p:txBody>
+      </p:sp>
+      <p:sp>
+        <p:nvSpPr>
+          <p:cNvPr id="5" name="Text Placeholder 2"/>
+          <p:cNvSpPr txBox="1"/>
+          <p:nvPr/>
+        </p:nvSpPr>
+        <p:spPr>
+          <a:xfrm>
+            <a:off x="404800" y="1001841"/>
+            <a:ext cx="8572500" cy="3733924"/>
+          </a:xfrm>
+          <a:prstGeom prst="rect">
+            <a:avLst/>
+          </a:prstGeom>
+          <a:ln w="12700">
+            <a:miter lim="400000"/>
+          </a:ln>
+        </p:spPr>
+        <p:txBody>
+          <a:bodyPr lIns="45718" tIns="45718" rIns="45718" bIns="45718">
+            <a:noAutofit/>
+          </a:bodyPr>
+          <a:lstStyle>
+            <a:lvl1pPr marL="342900" marR="0" indent="-342900" algn="l" defTabSz="457200" rtl="0" latinLnBrk="0">
+              <a:lnSpc>
+                <a:spcPct val="100000"/>
+              </a:lnSpc>
+              <a:spcBef>
+                <a:spcPts val="600"/>
+              </a:spcBef>
+              <a:spcAft>
+                <a:spcPts val="0"/>
+              </a:spcAft>
+              <a:buClrTx/>
+              <a:buSzPct val="100000"/>
+              <a:buFont typeface="Arial" panose="020B0604020202020204"/>
+              <a:buChar char="•"/>
+              <a:defRPr sz="2800" b="0" i="0" u="none" strike="noStrike" cap="none" spc="0" baseline="0">
+                <a:ln>
+                  <a:noFill/>
+                </a:ln>
+                <a:solidFill>
+                  <a:srgbClr val="000000"/>
+                </a:solidFill>
+                <a:uFillTx/>
+                <a:latin typeface="+mj-lt"/>
+                <a:ea typeface="+mj-ea"/>
+                <a:cs typeface="+mj-cs"/>
+                <a:sym typeface="Calibri"/>
+              </a:defRPr>
+            </a:lvl1pPr>
+            <a:lvl2pPr marL="790575" marR="0" indent="-333375" algn="l" defTabSz="457200" rtl="0" latinLnBrk="0">
+              <a:lnSpc>
+                <a:spcPct val="100000"/>
+              </a:lnSpc>
+              <a:spcBef>
+                <a:spcPts val="600"/>
+              </a:spcBef>
+              <a:spcAft>
+                <a:spcPts val="0"/>
+              </a:spcAft>
+              <a:buClrTx/>
+              <a:buSzPct val="100000"/>
+              <a:buFont typeface="Arial" panose="020B0604020202020204"/>
+              <a:buChar char="–"/>
+              <a:defRPr sz="2800" b="0" i="0" u="none" strike="noStrike" cap="none" spc="0" baseline="0">
+                <a:ln>
+                  <a:noFill/>
+                </a:ln>
+                <a:solidFill>
+                  <a:srgbClr val="000000"/>
+                </a:solidFill>
+                <a:uFillTx/>
+                <a:latin typeface="+mj-lt"/>
+                <a:ea typeface="+mj-ea"/>
+                <a:cs typeface="+mj-cs"/>
+                <a:sym typeface="Calibri"/>
+              </a:defRPr>
+            </a:lvl2pPr>
+            <a:lvl3pPr marL="1234440" marR="0" indent="-320040" algn="l" defTabSz="457200" rtl="0" latinLnBrk="0">
+              <a:lnSpc>
+                <a:spcPct val="100000"/>
+              </a:lnSpc>
+              <a:spcBef>
+                <a:spcPts val="600"/>
+              </a:spcBef>
+              <a:spcAft>
+                <a:spcPts val="0"/>
+              </a:spcAft>
+              <a:buClrTx/>
+              <a:buSzPct val="100000"/>
+              <a:buFont typeface="Arial" panose="020B0604020202020204"/>
+              <a:buChar char="•"/>
+              <a:defRPr sz="2800" b="0" i="0" u="none" strike="noStrike" cap="none" spc="0" baseline="0">
+                <a:ln>
+                  <a:noFill/>
+                </a:ln>
+                <a:solidFill>
+                  <a:srgbClr val="000000"/>
+                </a:solidFill>
+                <a:uFillTx/>
+                <a:latin typeface="+mj-lt"/>
+                <a:ea typeface="+mj-ea"/>
+                <a:cs typeface="+mj-cs"/>
+                <a:sym typeface="Calibri"/>
+              </a:defRPr>
+            </a:lvl3pPr>
+            <a:lvl4pPr marL="1727200" marR="0" indent="-355600" algn="l" defTabSz="457200" rtl="0" latinLnBrk="0">
+              <a:lnSpc>
+                <a:spcPct val="100000"/>
+              </a:lnSpc>
+              <a:spcBef>
+                <a:spcPts val="600"/>
+              </a:spcBef>
+              <a:spcAft>
+                <a:spcPts val="0"/>
+              </a:spcAft>
+              <a:buClrTx/>
+              <a:buSzPct val="100000"/>
+              <a:buFont typeface="Arial" panose="020B0604020202020204"/>
+              <a:buChar char="–"/>
+              <a:defRPr sz="2800" b="0" i="0" u="none" strike="noStrike" cap="none" spc="0" baseline="0">
+                <a:ln>
+                  <a:noFill/>
+                </a:ln>
+                <a:solidFill>
+                  <a:srgbClr val="000000"/>
+                </a:solidFill>
+                <a:uFillTx/>
+                <a:latin typeface="+mj-lt"/>
+                <a:ea typeface="+mj-ea"/>
+                <a:cs typeface="+mj-cs"/>
+                <a:sym typeface="Calibri"/>
+              </a:defRPr>
+            </a:lvl4pPr>
+            <a:lvl5pPr marL="2184400" marR="0" indent="-355600" algn="l" defTabSz="457200" rtl="0" latinLnBrk="0">
+              <a:lnSpc>
+                <a:spcPct val="100000"/>
+              </a:lnSpc>
+              <a:spcBef>
+                <a:spcPts val="600"/>
+              </a:spcBef>
+              <a:spcAft>
+                <a:spcPts val="0"/>
+              </a:spcAft>
+              <a:buClrTx/>
+              <a:buSzPct val="100000"/>
+              <a:buFont typeface="Arial" panose="020B0604020202020204"/>
+              <a:buChar char="»"/>
+              <a:defRPr sz="2800" b="0" i="0" u="none" strike="noStrike" cap="none" spc="0" baseline="0">
+                <a:ln>
+                  <a:noFill/>
+                </a:ln>
+                <a:solidFill>
+                  <a:srgbClr val="000000"/>
+                </a:solidFill>
+                <a:uFillTx/>
+                <a:latin typeface="+mj-lt"/>
+                <a:ea typeface="+mj-ea"/>
+                <a:cs typeface="+mj-cs"/>
+                <a:sym typeface="Calibri"/>
+              </a:defRPr>
+            </a:lvl5pPr>
+            <a:lvl6pPr marL="2651760" marR="0" indent="-365760" algn="l" defTabSz="457200" rtl="0" latinLnBrk="0">
+              <a:lnSpc>
+                <a:spcPct val="100000"/>
+              </a:lnSpc>
+              <a:spcBef>
+                <a:spcPts val="700"/>
+              </a:spcBef>
+              <a:spcAft>
+                <a:spcPts val="0"/>
+              </a:spcAft>
+              <a:buClrTx/>
+              <a:buSzPct val="100000"/>
+              <a:buFont typeface="Arial" panose="020B0604020202020204"/>
+              <a:buChar char="•"/>
+              <a:defRPr sz="3200" b="0" i="0" u="none" strike="noStrike" cap="none" spc="0" baseline="0">
+                <a:ln>
+                  <a:noFill/>
+                </a:ln>
+                <a:solidFill>
+                  <a:srgbClr val="000000"/>
+                </a:solidFill>
+                <a:uFillTx/>
+                <a:latin typeface="+mj-lt"/>
+                <a:ea typeface="+mj-ea"/>
+                <a:cs typeface="+mj-cs"/>
+                <a:sym typeface="Calibri"/>
+              </a:defRPr>
+            </a:lvl6pPr>
+            <a:lvl7pPr marL="3108960" marR="0" indent="-365760" algn="l" defTabSz="457200" rtl="0" latinLnBrk="0">
+              <a:lnSpc>
+                <a:spcPct val="100000"/>
+              </a:lnSpc>
+              <a:spcBef>
+                <a:spcPts val="700"/>
+              </a:spcBef>
+              <a:spcAft>
+                <a:spcPts val="0"/>
+              </a:spcAft>
+              <a:buClrTx/>
+              <a:buSzPct val="100000"/>
+              <a:buFont typeface="Arial" panose="020B0604020202020204"/>
+              <a:buChar char="•"/>
+              <a:defRPr sz="3200" b="0" i="0" u="none" strike="noStrike" cap="none" spc="0" baseline="0">
+                <a:ln>
+                  <a:noFill/>
+                </a:ln>
+                <a:solidFill>
+                  <a:srgbClr val="000000"/>
+                </a:solidFill>
+                <a:uFillTx/>
+                <a:latin typeface="+mj-lt"/>
+                <a:ea typeface="+mj-ea"/>
+                <a:cs typeface="+mj-cs"/>
+                <a:sym typeface="Calibri"/>
+              </a:defRPr>
+            </a:lvl7pPr>
+            <a:lvl8pPr marL="3566160" marR="0" indent="-365760" algn="l" defTabSz="457200" rtl="0" latinLnBrk="0">
+              <a:lnSpc>
+                <a:spcPct val="100000"/>
+              </a:lnSpc>
+              <a:spcBef>
+                <a:spcPts val="700"/>
+              </a:spcBef>
+              <a:spcAft>
+                <a:spcPts val="0"/>
+              </a:spcAft>
+              <a:buClrTx/>
+              <a:buSzPct val="100000"/>
+              <a:buFont typeface="Arial" panose="020B0604020202020204"/>
+              <a:buChar char="•"/>
+              <a:defRPr sz="3200" b="0" i="0" u="none" strike="noStrike" cap="none" spc="0" baseline="0">
+                <a:ln>
+                  <a:noFill/>
+                </a:ln>
+                <a:solidFill>
+                  <a:srgbClr val="000000"/>
+                </a:solidFill>
+                <a:uFillTx/>
+                <a:latin typeface="+mj-lt"/>
+                <a:ea typeface="+mj-ea"/>
+                <a:cs typeface="+mj-cs"/>
+                <a:sym typeface="Calibri"/>
+              </a:defRPr>
+            </a:lvl8pPr>
+            <a:lvl9pPr marL="4023360" marR="0" indent="-365760" algn="l" defTabSz="457200" rtl="0" latinLnBrk="0">
+              <a:lnSpc>
+                <a:spcPct val="100000"/>
+              </a:lnSpc>
+              <a:spcBef>
+                <a:spcPts val="700"/>
+              </a:spcBef>
+              <a:spcAft>
+                <a:spcPts val="0"/>
+              </a:spcAft>
+              <a:buClrTx/>
+              <a:buSzPct val="100000"/>
+              <a:buFont typeface="Arial" panose="020B0604020202020204"/>
+              <a:buChar char="•"/>
+              <a:defRPr sz="3200" b="0" i="0" u="none" strike="noStrike" cap="none" spc="0" baseline="0">
+                <a:ln>
+                  <a:noFill/>
+                </a:ln>
+                <a:solidFill>
+                  <a:srgbClr val="000000"/>
+                </a:solidFill>
+                <a:uFillTx/>
+                <a:latin typeface="+mj-lt"/>
+                <a:ea typeface="+mj-ea"/>
+                <a:cs typeface="+mj-cs"/>
+                <a:sym typeface="Calibri"/>
+              </a:defRPr>
+            </a:lvl9pPr>
+          </a:lstStyle>
+          <a:p>
+            <a:pPr marL="0" indent="0" algn="just" hangingPunct="1">
               <a:buNone/>
             </a:pPr>
             <a:endParaRPr lang="pt-BR" dirty="0">
@@ -22760,6 +24049,54 @@
               <a:buNone/>
             </a:pPr>
             <a:r>
+              <a:rPr lang="pt-BR" b="0" i="0" dirty="0">
+                <a:solidFill>
+                  <a:srgbClr val="303633"/>
+                </a:solidFill>
+                <a:effectLst/>
+                <a:latin typeface="Arial" panose="020B0604020202020204" pitchFamily="34" charset="0"/>
+                <a:cs typeface="Arial" panose="020B0604020202020204" pitchFamily="34" charset="0"/>
+              </a:rPr>
+              <a:t>O termo foi cunhado pela primeira vez por </a:t>
+            </a:r>
+            <a:r>
+              <a:rPr lang="pt-BR" b="1" i="0" dirty="0">
+                <a:solidFill>
+                  <a:srgbClr val="303633"/>
+                </a:solidFill>
+                <a:effectLst/>
+                <a:latin typeface="Arial" panose="020B0604020202020204" pitchFamily="34" charset="0"/>
+                <a:cs typeface="Arial" panose="020B0604020202020204" pitchFamily="34" charset="0"/>
+              </a:rPr>
+              <a:t>Kent Beck.</a:t>
+            </a:r>
+            <a:endParaRPr lang="pt-BR" b="1" dirty="0">
+              <a:solidFill>
+                <a:srgbClr val="FF0000"/>
+              </a:solidFill>
+              <a:latin typeface="Arial" panose="020B0604020202020204" pitchFamily="34" charset="0"/>
+              <a:cs typeface="Arial" panose="020B0604020202020204" pitchFamily="34" charset="0"/>
+              <a:sym typeface="+mn-ea"/>
+            </a:endParaRPr>
+          </a:p>
+          <a:p>
+            <a:pPr marL="0" indent="0" algn="just" hangingPunct="1">
+              <a:buNone/>
+            </a:pPr>
+            <a:endParaRPr lang="pt-BR" dirty="0">
+              <a:solidFill>
+                <a:srgbClr val="FF0000"/>
+              </a:solidFill>
+              <a:latin typeface="Arial" panose="020B0604020202020204" pitchFamily="34" charset="0"/>
+              <a:cs typeface="Arial" panose="020B0604020202020204" pitchFamily="34" charset="0"/>
+              <a:sym typeface="+mn-ea"/>
+            </a:endParaRPr>
+          </a:p>
+          <a:p>
+            <a:pPr marL="0" indent="0" algn="just" hangingPunct="1">
+              <a:buNone/>
+            </a:pPr>
+            <a:r>
               <a:rPr lang="pt-BR" dirty="0">
                 <a:latin typeface="Arial" panose="020B0604020202020204" pitchFamily="34" charset="0"/>
                 <a:cs typeface="Arial" panose="020B0604020202020204" pitchFamily="34" charset="0"/>
@@ -22770,7 +24107,195 @@
             <a:endParaRPr lang="pt-BR" dirty="0">
               <a:latin typeface="Arial" panose="020B0604020202020204" pitchFamily="34" charset="0"/>
               <a:cs typeface="Arial" panose="020B0604020202020204" pitchFamily="34" charset="0"/>
-              <a:sym typeface="+mn-ea"/>
+            </a:endParaRPr>
+          </a:p>
+          <a:p>
+            <a:pPr marL="0" indent="0" algn="just" hangingPunct="1">
+              <a:buNone/>
+            </a:pPr>
+            <a:endParaRPr lang="pt-BR" dirty="0">
+              <a:latin typeface="Arial" panose="020B0604020202020204" pitchFamily="34" charset="0"/>
+              <a:cs typeface="Arial" panose="020B0604020202020204" pitchFamily="34" charset="0"/>
+            </a:endParaRPr>
+          </a:p>
+          <a:p>
+            <a:pPr marL="0" indent="0" algn="just" hangingPunct="1">
+              <a:buNone/>
+            </a:pPr>
+            <a:endParaRPr lang="pt-BR" dirty="0">
+              <a:latin typeface="Arial" panose="020B0604020202020204" pitchFamily="34" charset="0"/>
+              <a:cs typeface="Arial" panose="020B0604020202020204" pitchFamily="34" charset="0"/>
+            </a:endParaRPr>
+          </a:p>
+        </p:txBody>
+      </p:sp>
+    </p:spTree>
+    <p:extLst>
+      <p:ext uri="{BB962C8B-B14F-4D97-AF65-F5344CB8AC3E}">
+        <p14:creationId xmlns:p14="http://schemas.microsoft.com/office/powerpoint/2010/main" val="4068917672"/>
+      </p:ext>
+    </p:extLst>
+  </p:cSld>
+  <p:clrMapOvr>
+    <a:masterClrMapping/>
+  </p:clrMapOvr>
+  <p:transition spd="med"/>
+</p:sld>
+</file>
+
+<file path=ppt/slides/slide4.xml><?xml version="1.0" encoding="utf-8"?>
+<p:sld xmlns:a="http://schemas.openxmlformats.org/drawingml/2006/main" xmlns:r="http://schemas.openxmlformats.org/officeDocument/2006/relationships" xmlns:p="http://schemas.openxmlformats.org/presentationml/2006/main">
+  <p:cSld>
+    <p:spTree>
+      <p:nvGrpSpPr>
+        <p:cNvPr id="1" name=""/>
+        <p:cNvGrpSpPr/>
+        <p:nvPr/>
+      </p:nvGrpSpPr>
+      <p:grpSpPr>
+        <a:xfrm>
+          <a:off x="0" y="0"/>
+          <a:ext cx="0" cy="0"/>
+          <a:chOff x="0" y="0"/>
+          <a:chExt cx="0" cy="0"/>
+        </a:xfrm>
+      </p:grpSpPr>
+      <p:sp>
+        <p:nvSpPr>
+          <p:cNvPr id="6" name="Title 1"/>
+          <p:cNvSpPr>
+            <a:spLocks noGrp="1"/>
+          </p:cNvSpPr>
+          <p:nvPr>
+            <p:ph type="title"/>
+          </p:nvPr>
+        </p:nvSpPr>
+        <p:spPr>
+          <a:xfrm>
+            <a:off x="457200" y="205979"/>
+            <a:ext cx="8229600" cy="857251"/>
+          </a:xfrm>
+        </p:spPr>
+        <p:txBody>
+          <a:bodyPr/>
+          <a:lstStyle/>
+          <a:p>
+            <a:r>
+              <a:rPr lang="en-US" b="1" dirty="0" err="1">
+                <a:solidFill>
+                  <a:srgbClr val="0070C0"/>
+                </a:solidFill>
+              </a:rPr>
+              <a:t>Refatoração</a:t>
+            </a:r>
+            <a:r>
+              <a:rPr lang="en-US" b="1" dirty="0">
+                <a:solidFill>
+                  <a:srgbClr val="0070C0"/>
+                </a:solidFill>
+              </a:rPr>
+              <a:t> – </a:t>
+            </a:r>
+            <a:r>
+              <a:rPr lang="en-US" b="1" dirty="0" err="1">
+                <a:solidFill>
+                  <a:srgbClr val="0070C0"/>
+                </a:solidFill>
+              </a:rPr>
+              <a:t>Por</a:t>
+            </a:r>
+            <a:r>
+              <a:rPr lang="en-US" b="1" dirty="0">
+                <a:solidFill>
+                  <a:srgbClr val="0070C0"/>
+                </a:solidFill>
+              </a:rPr>
+              <a:t> que?</a:t>
+            </a:r>
+          </a:p>
+        </p:txBody>
+      </p:sp>
+      <p:sp>
+        <p:nvSpPr>
+          <p:cNvPr id="8" name="Text Placeholder 2"/>
+          <p:cNvSpPr>
+            <a:spLocks noGrp="1"/>
+          </p:cNvSpPr>
+          <p:nvPr>
+            <p:ph type="body" sz="half" idx="1"/>
+          </p:nvPr>
+        </p:nvSpPr>
+        <p:spPr>
+          <a:xfrm>
+            <a:off x="457200" y="1200151"/>
+            <a:ext cx="8572500" cy="3394472"/>
+          </a:xfrm>
+        </p:spPr>
+        <p:txBody>
+          <a:bodyPr>
+            <a:noAutofit/>
+          </a:bodyPr>
+          <a:lstStyle/>
+          <a:p>
+            <a:pPr algn="just">
+              <a:buFont typeface="Wingdings" panose="05000000000000000000" pitchFamily="2" charset="2"/>
+              <a:buChar char="§"/>
+            </a:pPr>
+            <a:r>
+              <a:rPr lang="pt-BR" dirty="0">
+                <a:latin typeface="Arial" panose="020B0604020202020204" pitchFamily="34" charset="0"/>
+                <a:cs typeface="Arial" panose="020B0604020202020204" pitchFamily="34" charset="0"/>
+              </a:rPr>
+              <a:t>Melhora o projeto do software</a:t>
+            </a:r>
+          </a:p>
+          <a:p>
+            <a:pPr algn="just">
+              <a:buFont typeface="Wingdings" panose="05000000000000000000" pitchFamily="2" charset="2"/>
+              <a:buChar char="§"/>
+            </a:pPr>
+            <a:r>
+              <a:rPr lang="pt-BR" dirty="0">
+                <a:latin typeface="Arial" panose="020B0604020202020204" pitchFamily="34" charset="0"/>
+                <a:cs typeface="Arial" panose="020B0604020202020204" pitchFamily="34" charset="0"/>
+              </a:rPr>
+              <a:t>Torna o software mais fácil de entender</a:t>
+            </a:r>
+          </a:p>
+          <a:p>
+            <a:pPr algn="just">
+              <a:buFont typeface="Wingdings" panose="05000000000000000000" pitchFamily="2" charset="2"/>
+              <a:buChar char="§"/>
+            </a:pPr>
+            <a:r>
+              <a:rPr lang="pt-BR" dirty="0">
+                <a:latin typeface="Arial" panose="020B0604020202020204" pitchFamily="34" charset="0"/>
+                <a:cs typeface="Arial" panose="020B0604020202020204" pitchFamily="34" charset="0"/>
+              </a:rPr>
+              <a:t>Ajuda a encontrar falhas</a:t>
+            </a:r>
+          </a:p>
+          <a:p>
+            <a:pPr algn="just">
+              <a:buFont typeface="Wingdings" panose="05000000000000000000" pitchFamily="2" charset="2"/>
+              <a:buChar char="§"/>
+            </a:pPr>
+            <a:r>
+              <a:rPr lang="pt-BR" dirty="0">
+                <a:latin typeface="Arial" panose="020B0604020202020204" pitchFamily="34" charset="0"/>
+                <a:cs typeface="Arial" panose="020B0604020202020204" pitchFamily="34" charset="0"/>
+              </a:rPr>
+              <a:t>Ajuda a programar mais rapidamente</a:t>
+            </a:r>
+          </a:p>
+          <a:p>
+            <a:pPr algn="just">
+              <a:buFont typeface="Wingdings" panose="05000000000000000000" pitchFamily="2" charset="2"/>
+              <a:buChar char="§"/>
+            </a:pPr>
+            <a:endParaRPr lang="pt-PT" altLang="pt-BR" dirty="0">
+              <a:latin typeface="Arial" panose="020B0604020202020204" pitchFamily="34" charset="0"/>
+              <a:cs typeface="Arial" panose="020B0604020202020204" pitchFamily="34" charset="0"/>
             </a:endParaRPr>
           </a:p>
         </p:txBody>
@@ -22784,7 +24309,723 @@
 </p:sld>
 </file>
 
-<file path=ppt/slides/slide39.xml><?xml version="1.0" encoding="utf-8"?>
+<file path=ppt/slides/slide40.xml><?xml version="1.0" encoding="utf-8"?>
+<p:sld xmlns:a="http://schemas.openxmlformats.org/drawingml/2006/main" xmlns:r="http://schemas.openxmlformats.org/officeDocument/2006/relationships" xmlns:p="http://schemas.openxmlformats.org/presentationml/2006/main">
+  <p:cSld>
+    <p:spTree>
+      <p:nvGrpSpPr>
+        <p:cNvPr id="1" name=""/>
+        <p:cNvGrpSpPr/>
+        <p:nvPr/>
+      </p:nvGrpSpPr>
+      <p:grpSpPr>
+        <a:xfrm>
+          <a:off x="0" y="0"/>
+          <a:ext cx="0" cy="0"/>
+          <a:chOff x="0" y="0"/>
+          <a:chExt cx="0" cy="0"/>
+        </a:xfrm>
+      </p:grpSpPr>
+      <p:sp>
+        <p:nvSpPr>
+          <p:cNvPr id="6" name="Title 1"/>
+          <p:cNvSpPr>
+            <a:spLocks noGrp="1"/>
+          </p:cNvSpPr>
+          <p:nvPr>
+            <p:ph type="title"/>
+          </p:nvPr>
+        </p:nvSpPr>
+        <p:spPr>
+          <a:xfrm>
+            <a:off x="457200" y="205979"/>
+            <a:ext cx="8229600" cy="857251"/>
+          </a:xfrm>
+        </p:spPr>
+        <p:txBody>
+          <a:bodyPr/>
+          <a:lstStyle/>
+          <a:p>
+            <a:r>
+              <a:rPr lang="en-US" b="1" dirty="0" err="1">
+                <a:solidFill>
+                  <a:srgbClr val="0070C0"/>
+                </a:solidFill>
+              </a:rPr>
+              <a:t>Aprenda</a:t>
+            </a:r>
+            <a:r>
+              <a:rPr lang="en-US" b="1" dirty="0">
+                <a:solidFill>
+                  <a:srgbClr val="0070C0"/>
+                </a:solidFill>
+              </a:rPr>
+              <a:t>+ - Code Smell</a:t>
+            </a:r>
+          </a:p>
+        </p:txBody>
+      </p:sp>
+      <p:sp>
+        <p:nvSpPr>
+          <p:cNvPr id="11" name="Text Placeholder 2"/>
+          <p:cNvSpPr txBox="1"/>
+          <p:nvPr/>
+        </p:nvSpPr>
+        <p:spPr>
+          <a:xfrm>
+            <a:off x="252400" y="887541"/>
+            <a:ext cx="8572500" cy="3733924"/>
+          </a:xfrm>
+          <a:prstGeom prst="rect">
+            <a:avLst/>
+          </a:prstGeom>
+          <a:ln w="12700">
+            <a:miter lim="400000"/>
+          </a:ln>
+        </p:spPr>
+        <p:txBody>
+          <a:bodyPr lIns="45718" tIns="45718" rIns="45718" bIns="45718">
+            <a:noAutofit/>
+          </a:bodyPr>
+          <a:lstStyle>
+            <a:lvl1pPr marL="342900" marR="0" indent="-342900" algn="l" defTabSz="457200" rtl="0" latinLnBrk="0">
+              <a:lnSpc>
+                <a:spcPct val="100000"/>
+              </a:lnSpc>
+              <a:spcBef>
+                <a:spcPts val="600"/>
+              </a:spcBef>
+              <a:spcAft>
+                <a:spcPts val="0"/>
+              </a:spcAft>
+              <a:buClrTx/>
+              <a:buSzPct val="100000"/>
+              <a:buFont typeface="Arial" panose="020B0604020202020204"/>
+              <a:buChar char="•"/>
+              <a:defRPr sz="2800" b="0" i="0" u="none" strike="noStrike" cap="none" spc="0" baseline="0">
+                <a:ln>
+                  <a:noFill/>
+                </a:ln>
+                <a:solidFill>
+                  <a:srgbClr val="000000"/>
+                </a:solidFill>
+                <a:uFillTx/>
+                <a:latin typeface="+mj-lt"/>
+                <a:ea typeface="+mj-ea"/>
+                <a:cs typeface="+mj-cs"/>
+                <a:sym typeface="Calibri"/>
+              </a:defRPr>
+            </a:lvl1pPr>
+            <a:lvl2pPr marL="790575" marR="0" indent="-333375" algn="l" defTabSz="457200" rtl="0" latinLnBrk="0">
+              <a:lnSpc>
+                <a:spcPct val="100000"/>
+              </a:lnSpc>
+              <a:spcBef>
+                <a:spcPts val="600"/>
+              </a:spcBef>
+              <a:spcAft>
+                <a:spcPts val="0"/>
+              </a:spcAft>
+              <a:buClrTx/>
+              <a:buSzPct val="100000"/>
+              <a:buFont typeface="Arial" panose="020B0604020202020204"/>
+              <a:buChar char="–"/>
+              <a:defRPr sz="2800" b="0" i="0" u="none" strike="noStrike" cap="none" spc="0" baseline="0">
+                <a:ln>
+                  <a:noFill/>
+                </a:ln>
+                <a:solidFill>
+                  <a:srgbClr val="000000"/>
+                </a:solidFill>
+                <a:uFillTx/>
+                <a:latin typeface="+mj-lt"/>
+                <a:ea typeface="+mj-ea"/>
+                <a:cs typeface="+mj-cs"/>
+                <a:sym typeface="Calibri"/>
+              </a:defRPr>
+            </a:lvl2pPr>
+            <a:lvl3pPr marL="1234440" marR="0" indent="-320040" algn="l" defTabSz="457200" rtl="0" latinLnBrk="0">
+              <a:lnSpc>
+                <a:spcPct val="100000"/>
+              </a:lnSpc>
+              <a:spcBef>
+                <a:spcPts val="600"/>
+              </a:spcBef>
+              <a:spcAft>
+                <a:spcPts val="0"/>
+              </a:spcAft>
+              <a:buClrTx/>
+              <a:buSzPct val="100000"/>
+              <a:buFont typeface="Arial" panose="020B0604020202020204"/>
+              <a:buChar char="•"/>
+              <a:defRPr sz="2800" b="0" i="0" u="none" strike="noStrike" cap="none" spc="0" baseline="0">
+                <a:ln>
+                  <a:noFill/>
+                </a:ln>
+                <a:solidFill>
+                  <a:srgbClr val="000000"/>
+                </a:solidFill>
+                <a:uFillTx/>
+                <a:latin typeface="+mj-lt"/>
+                <a:ea typeface="+mj-ea"/>
+                <a:cs typeface="+mj-cs"/>
+                <a:sym typeface="Calibri"/>
+              </a:defRPr>
+            </a:lvl3pPr>
+            <a:lvl4pPr marL="1727200" marR="0" indent="-355600" algn="l" defTabSz="457200" rtl="0" latinLnBrk="0">
+              <a:lnSpc>
+                <a:spcPct val="100000"/>
+              </a:lnSpc>
+              <a:spcBef>
+                <a:spcPts val="600"/>
+              </a:spcBef>
+              <a:spcAft>
+                <a:spcPts val="0"/>
+              </a:spcAft>
+              <a:buClrTx/>
+              <a:buSzPct val="100000"/>
+              <a:buFont typeface="Arial" panose="020B0604020202020204"/>
+              <a:buChar char="–"/>
+              <a:defRPr sz="2800" b="0" i="0" u="none" strike="noStrike" cap="none" spc="0" baseline="0">
+                <a:ln>
+                  <a:noFill/>
+                </a:ln>
+                <a:solidFill>
+                  <a:srgbClr val="000000"/>
+                </a:solidFill>
+                <a:uFillTx/>
+                <a:latin typeface="+mj-lt"/>
+                <a:ea typeface="+mj-ea"/>
+                <a:cs typeface="+mj-cs"/>
+                <a:sym typeface="Calibri"/>
+              </a:defRPr>
+            </a:lvl4pPr>
+            <a:lvl5pPr marL="2184400" marR="0" indent="-355600" algn="l" defTabSz="457200" rtl="0" latinLnBrk="0">
+              <a:lnSpc>
+                <a:spcPct val="100000"/>
+              </a:lnSpc>
+              <a:spcBef>
+                <a:spcPts val="600"/>
+              </a:spcBef>
+              <a:spcAft>
+                <a:spcPts val="0"/>
+              </a:spcAft>
+              <a:buClrTx/>
+              <a:buSzPct val="100000"/>
+              <a:buFont typeface="Arial" panose="020B0604020202020204"/>
+              <a:buChar char="»"/>
+              <a:defRPr sz="2800" b="0" i="0" u="none" strike="noStrike" cap="none" spc="0" baseline="0">
+                <a:ln>
+                  <a:noFill/>
+                </a:ln>
+                <a:solidFill>
+                  <a:srgbClr val="000000"/>
+                </a:solidFill>
+                <a:uFillTx/>
+                <a:latin typeface="+mj-lt"/>
+                <a:ea typeface="+mj-ea"/>
+                <a:cs typeface="+mj-cs"/>
+                <a:sym typeface="Calibri"/>
+              </a:defRPr>
+            </a:lvl5pPr>
+            <a:lvl6pPr marL="2651760" marR="0" indent="-365760" algn="l" defTabSz="457200" rtl="0" latinLnBrk="0">
+              <a:lnSpc>
+                <a:spcPct val="100000"/>
+              </a:lnSpc>
+              <a:spcBef>
+                <a:spcPts val="700"/>
+              </a:spcBef>
+              <a:spcAft>
+                <a:spcPts val="0"/>
+              </a:spcAft>
+              <a:buClrTx/>
+              <a:buSzPct val="100000"/>
+              <a:buFont typeface="Arial" panose="020B0604020202020204"/>
+              <a:buChar char="•"/>
+              <a:defRPr sz="3200" b="0" i="0" u="none" strike="noStrike" cap="none" spc="0" baseline="0">
+                <a:ln>
+                  <a:noFill/>
+                </a:ln>
+                <a:solidFill>
+                  <a:srgbClr val="000000"/>
+                </a:solidFill>
+                <a:uFillTx/>
+                <a:latin typeface="+mj-lt"/>
+                <a:ea typeface="+mj-ea"/>
+                <a:cs typeface="+mj-cs"/>
+                <a:sym typeface="Calibri"/>
+              </a:defRPr>
+            </a:lvl6pPr>
+            <a:lvl7pPr marL="3108960" marR="0" indent="-365760" algn="l" defTabSz="457200" rtl="0" latinLnBrk="0">
+              <a:lnSpc>
+                <a:spcPct val="100000"/>
+              </a:lnSpc>
+              <a:spcBef>
+                <a:spcPts val="700"/>
+              </a:spcBef>
+              <a:spcAft>
+                <a:spcPts val="0"/>
+              </a:spcAft>
+              <a:buClrTx/>
+              <a:buSzPct val="100000"/>
+              <a:buFont typeface="Arial" panose="020B0604020202020204"/>
+              <a:buChar char="•"/>
+              <a:defRPr sz="3200" b="0" i="0" u="none" strike="noStrike" cap="none" spc="0" baseline="0">
+                <a:ln>
+                  <a:noFill/>
+                </a:ln>
+                <a:solidFill>
+                  <a:srgbClr val="000000"/>
+                </a:solidFill>
+                <a:uFillTx/>
+                <a:latin typeface="+mj-lt"/>
+                <a:ea typeface="+mj-ea"/>
+                <a:cs typeface="+mj-cs"/>
+                <a:sym typeface="Calibri"/>
+              </a:defRPr>
+            </a:lvl7pPr>
+            <a:lvl8pPr marL="3566160" marR="0" indent="-365760" algn="l" defTabSz="457200" rtl="0" latinLnBrk="0">
+              <a:lnSpc>
+                <a:spcPct val="100000"/>
+              </a:lnSpc>
+              <a:spcBef>
+                <a:spcPts val="700"/>
+              </a:spcBef>
+              <a:spcAft>
+                <a:spcPts val="0"/>
+              </a:spcAft>
+              <a:buClrTx/>
+              <a:buSzPct val="100000"/>
+              <a:buFont typeface="Arial" panose="020B0604020202020204"/>
+              <a:buChar char="•"/>
+              <a:defRPr sz="3200" b="0" i="0" u="none" strike="noStrike" cap="none" spc="0" baseline="0">
+                <a:ln>
+                  <a:noFill/>
+                </a:ln>
+                <a:solidFill>
+                  <a:srgbClr val="000000"/>
+                </a:solidFill>
+                <a:uFillTx/>
+                <a:latin typeface="+mj-lt"/>
+                <a:ea typeface="+mj-ea"/>
+                <a:cs typeface="+mj-cs"/>
+                <a:sym typeface="Calibri"/>
+              </a:defRPr>
+            </a:lvl8pPr>
+            <a:lvl9pPr marL="4023360" marR="0" indent="-365760" algn="l" defTabSz="457200" rtl="0" latinLnBrk="0">
+              <a:lnSpc>
+                <a:spcPct val="100000"/>
+              </a:lnSpc>
+              <a:spcBef>
+                <a:spcPts val="700"/>
+              </a:spcBef>
+              <a:spcAft>
+                <a:spcPts val="0"/>
+              </a:spcAft>
+              <a:buClrTx/>
+              <a:buSzPct val="100000"/>
+              <a:buFont typeface="Arial" panose="020B0604020202020204"/>
+              <a:buChar char="•"/>
+              <a:defRPr sz="3200" b="0" i="0" u="none" strike="noStrike" cap="none" spc="0" baseline="0">
+                <a:ln>
+                  <a:noFill/>
+                </a:ln>
+                <a:solidFill>
+                  <a:srgbClr val="000000"/>
+                </a:solidFill>
+                <a:uFillTx/>
+                <a:latin typeface="+mj-lt"/>
+                <a:ea typeface="+mj-ea"/>
+                <a:cs typeface="+mj-cs"/>
+                <a:sym typeface="Calibri"/>
+              </a:defRPr>
+            </a:lvl9pPr>
+          </a:lstStyle>
+          <a:p>
+            <a:pPr marL="0" indent="0" algn="just" hangingPunct="1">
+              <a:buFont typeface="Arial" panose="020B0604020202020204"/>
+              <a:buNone/>
+            </a:pPr>
+            <a:endParaRPr lang="pt-BR" sz="2400" dirty="0"/>
+          </a:p>
+          <a:p>
+            <a:pPr marL="0" indent="0" algn="just" hangingPunct="1">
+              <a:buFont typeface="Arial" panose="020B0604020202020204"/>
+              <a:buNone/>
+            </a:pPr>
+            <a:endParaRPr lang="pt-BR" b="1" u="sng" dirty="0"/>
+          </a:p>
+        </p:txBody>
+      </p:sp>
+      <p:sp>
+        <p:nvSpPr>
+          <p:cNvPr id="5" name="Text Placeholder 2"/>
+          <p:cNvSpPr txBox="1"/>
+          <p:nvPr/>
+        </p:nvSpPr>
+        <p:spPr>
+          <a:xfrm>
+            <a:off x="404800" y="1001841"/>
+            <a:ext cx="8572500" cy="3733924"/>
+          </a:xfrm>
+          <a:prstGeom prst="rect">
+            <a:avLst/>
+          </a:prstGeom>
+          <a:ln w="12700">
+            <a:miter lim="400000"/>
+          </a:ln>
+        </p:spPr>
+        <p:txBody>
+          <a:bodyPr lIns="45718" tIns="45718" rIns="45718" bIns="45718">
+            <a:noAutofit/>
+          </a:bodyPr>
+          <a:lstStyle>
+            <a:lvl1pPr marL="342900" marR="0" indent="-342900" algn="l" defTabSz="457200" rtl="0" latinLnBrk="0">
+              <a:lnSpc>
+                <a:spcPct val="100000"/>
+              </a:lnSpc>
+              <a:spcBef>
+                <a:spcPts val="600"/>
+              </a:spcBef>
+              <a:spcAft>
+                <a:spcPts val="0"/>
+              </a:spcAft>
+              <a:buClrTx/>
+              <a:buSzPct val="100000"/>
+              <a:buFont typeface="Arial" panose="020B0604020202020204"/>
+              <a:buChar char="•"/>
+              <a:defRPr sz="2800" b="0" i="0" u="none" strike="noStrike" cap="none" spc="0" baseline="0">
+                <a:ln>
+                  <a:noFill/>
+                </a:ln>
+                <a:solidFill>
+                  <a:srgbClr val="000000"/>
+                </a:solidFill>
+                <a:uFillTx/>
+                <a:latin typeface="+mj-lt"/>
+                <a:ea typeface="+mj-ea"/>
+                <a:cs typeface="+mj-cs"/>
+                <a:sym typeface="Calibri"/>
+              </a:defRPr>
+            </a:lvl1pPr>
+            <a:lvl2pPr marL="790575" marR="0" indent="-333375" algn="l" defTabSz="457200" rtl="0" latinLnBrk="0">
+              <a:lnSpc>
+                <a:spcPct val="100000"/>
+              </a:lnSpc>
+              <a:spcBef>
+                <a:spcPts val="600"/>
+              </a:spcBef>
+              <a:spcAft>
+                <a:spcPts val="0"/>
+              </a:spcAft>
+              <a:buClrTx/>
+              <a:buSzPct val="100000"/>
+              <a:buFont typeface="Arial" panose="020B0604020202020204"/>
+              <a:buChar char="–"/>
+              <a:defRPr sz="2800" b="0" i="0" u="none" strike="noStrike" cap="none" spc="0" baseline="0">
+                <a:ln>
+                  <a:noFill/>
+                </a:ln>
+                <a:solidFill>
+                  <a:srgbClr val="000000"/>
+                </a:solidFill>
+                <a:uFillTx/>
+                <a:latin typeface="+mj-lt"/>
+                <a:ea typeface="+mj-ea"/>
+                <a:cs typeface="+mj-cs"/>
+                <a:sym typeface="Calibri"/>
+              </a:defRPr>
+            </a:lvl2pPr>
+            <a:lvl3pPr marL="1234440" marR="0" indent="-320040" algn="l" defTabSz="457200" rtl="0" latinLnBrk="0">
+              <a:lnSpc>
+                <a:spcPct val="100000"/>
+              </a:lnSpc>
+              <a:spcBef>
+                <a:spcPts val="600"/>
+              </a:spcBef>
+              <a:spcAft>
+                <a:spcPts val="0"/>
+              </a:spcAft>
+              <a:buClrTx/>
+              <a:buSzPct val="100000"/>
+              <a:buFont typeface="Arial" panose="020B0604020202020204"/>
+              <a:buChar char="•"/>
+              <a:defRPr sz="2800" b="0" i="0" u="none" strike="noStrike" cap="none" spc="0" baseline="0">
+                <a:ln>
+                  <a:noFill/>
+                </a:ln>
+                <a:solidFill>
+                  <a:srgbClr val="000000"/>
+                </a:solidFill>
+                <a:uFillTx/>
+                <a:latin typeface="+mj-lt"/>
+                <a:ea typeface="+mj-ea"/>
+                <a:cs typeface="+mj-cs"/>
+                <a:sym typeface="Calibri"/>
+              </a:defRPr>
+            </a:lvl3pPr>
+            <a:lvl4pPr marL="1727200" marR="0" indent="-355600" algn="l" defTabSz="457200" rtl="0" latinLnBrk="0">
+              <a:lnSpc>
+                <a:spcPct val="100000"/>
+              </a:lnSpc>
+              <a:spcBef>
+                <a:spcPts val="600"/>
+              </a:spcBef>
+              <a:spcAft>
+                <a:spcPts val="0"/>
+              </a:spcAft>
+              <a:buClrTx/>
+              <a:buSzPct val="100000"/>
+              <a:buFont typeface="Arial" panose="020B0604020202020204"/>
+              <a:buChar char="–"/>
+              <a:defRPr sz="2800" b="0" i="0" u="none" strike="noStrike" cap="none" spc="0" baseline="0">
+                <a:ln>
+                  <a:noFill/>
+                </a:ln>
+                <a:solidFill>
+                  <a:srgbClr val="000000"/>
+                </a:solidFill>
+                <a:uFillTx/>
+                <a:latin typeface="+mj-lt"/>
+                <a:ea typeface="+mj-ea"/>
+                <a:cs typeface="+mj-cs"/>
+                <a:sym typeface="Calibri"/>
+              </a:defRPr>
+            </a:lvl4pPr>
+            <a:lvl5pPr marL="2184400" marR="0" indent="-355600" algn="l" defTabSz="457200" rtl="0" latinLnBrk="0">
+              <a:lnSpc>
+                <a:spcPct val="100000"/>
+              </a:lnSpc>
+              <a:spcBef>
+                <a:spcPts val="600"/>
+              </a:spcBef>
+              <a:spcAft>
+                <a:spcPts val="0"/>
+              </a:spcAft>
+              <a:buClrTx/>
+              <a:buSzPct val="100000"/>
+              <a:buFont typeface="Arial" panose="020B0604020202020204"/>
+              <a:buChar char="»"/>
+              <a:defRPr sz="2800" b="0" i="0" u="none" strike="noStrike" cap="none" spc="0" baseline="0">
+                <a:ln>
+                  <a:noFill/>
+                </a:ln>
+                <a:solidFill>
+                  <a:srgbClr val="000000"/>
+                </a:solidFill>
+                <a:uFillTx/>
+                <a:latin typeface="+mj-lt"/>
+                <a:ea typeface="+mj-ea"/>
+                <a:cs typeface="+mj-cs"/>
+                <a:sym typeface="Calibri"/>
+              </a:defRPr>
+            </a:lvl5pPr>
+            <a:lvl6pPr marL="2651760" marR="0" indent="-365760" algn="l" defTabSz="457200" rtl="0" latinLnBrk="0">
+              <a:lnSpc>
+                <a:spcPct val="100000"/>
+              </a:lnSpc>
+              <a:spcBef>
+                <a:spcPts val="700"/>
+              </a:spcBef>
+              <a:spcAft>
+                <a:spcPts val="0"/>
+              </a:spcAft>
+              <a:buClrTx/>
+              <a:buSzPct val="100000"/>
+              <a:buFont typeface="Arial" panose="020B0604020202020204"/>
+              <a:buChar char="•"/>
+              <a:defRPr sz="3200" b="0" i="0" u="none" strike="noStrike" cap="none" spc="0" baseline="0">
+                <a:ln>
+                  <a:noFill/>
+                </a:ln>
+                <a:solidFill>
+                  <a:srgbClr val="000000"/>
+                </a:solidFill>
+                <a:uFillTx/>
+                <a:latin typeface="+mj-lt"/>
+                <a:ea typeface="+mj-ea"/>
+                <a:cs typeface="+mj-cs"/>
+                <a:sym typeface="Calibri"/>
+              </a:defRPr>
+            </a:lvl6pPr>
+            <a:lvl7pPr marL="3108960" marR="0" indent="-365760" algn="l" defTabSz="457200" rtl="0" latinLnBrk="0">
+              <a:lnSpc>
+                <a:spcPct val="100000"/>
+              </a:lnSpc>
+              <a:spcBef>
+                <a:spcPts val="700"/>
+              </a:spcBef>
+              <a:spcAft>
+                <a:spcPts val="0"/>
+              </a:spcAft>
+              <a:buClrTx/>
+              <a:buSzPct val="100000"/>
+              <a:buFont typeface="Arial" panose="020B0604020202020204"/>
+              <a:buChar char="•"/>
+              <a:defRPr sz="3200" b="0" i="0" u="none" strike="noStrike" cap="none" spc="0" baseline="0">
+                <a:ln>
+                  <a:noFill/>
+                </a:ln>
+                <a:solidFill>
+                  <a:srgbClr val="000000"/>
+                </a:solidFill>
+                <a:uFillTx/>
+                <a:latin typeface="+mj-lt"/>
+                <a:ea typeface="+mj-ea"/>
+                <a:cs typeface="+mj-cs"/>
+                <a:sym typeface="Calibri"/>
+              </a:defRPr>
+            </a:lvl7pPr>
+            <a:lvl8pPr marL="3566160" marR="0" indent="-365760" algn="l" defTabSz="457200" rtl="0" latinLnBrk="0">
+              <a:lnSpc>
+                <a:spcPct val="100000"/>
+              </a:lnSpc>
+              <a:spcBef>
+                <a:spcPts val="700"/>
+              </a:spcBef>
+              <a:spcAft>
+                <a:spcPts val="0"/>
+              </a:spcAft>
+              <a:buClrTx/>
+              <a:buSzPct val="100000"/>
+              <a:buFont typeface="Arial" panose="020B0604020202020204"/>
+              <a:buChar char="•"/>
+              <a:defRPr sz="3200" b="0" i="0" u="none" strike="noStrike" cap="none" spc="0" baseline="0">
+                <a:ln>
+                  <a:noFill/>
+                </a:ln>
+                <a:solidFill>
+                  <a:srgbClr val="000000"/>
+                </a:solidFill>
+                <a:uFillTx/>
+                <a:latin typeface="+mj-lt"/>
+                <a:ea typeface="+mj-ea"/>
+                <a:cs typeface="+mj-cs"/>
+                <a:sym typeface="Calibri"/>
+              </a:defRPr>
+            </a:lvl8pPr>
+            <a:lvl9pPr marL="4023360" marR="0" indent="-365760" algn="l" defTabSz="457200" rtl="0" latinLnBrk="0">
+              <a:lnSpc>
+                <a:spcPct val="100000"/>
+              </a:lnSpc>
+              <a:spcBef>
+                <a:spcPts val="700"/>
+              </a:spcBef>
+              <a:spcAft>
+                <a:spcPts val="0"/>
+              </a:spcAft>
+              <a:buClrTx/>
+              <a:buSzPct val="100000"/>
+              <a:buFont typeface="Arial" panose="020B0604020202020204"/>
+              <a:buChar char="•"/>
+              <a:defRPr sz="3200" b="0" i="0" u="none" strike="noStrike" cap="none" spc="0" baseline="0">
+                <a:ln>
+                  <a:noFill/>
+                </a:ln>
+                <a:solidFill>
+                  <a:srgbClr val="000000"/>
+                </a:solidFill>
+                <a:uFillTx/>
+                <a:latin typeface="+mj-lt"/>
+                <a:ea typeface="+mj-ea"/>
+                <a:cs typeface="+mj-cs"/>
+                <a:sym typeface="Calibri"/>
+              </a:defRPr>
+            </a:lvl9pPr>
+          </a:lstStyle>
+          <a:p>
+            <a:pPr marL="447675" lvl="1" indent="0" algn="just" hangingPunct="1">
+              <a:buNone/>
+            </a:pPr>
+            <a:endParaRPr lang="pt-BR" dirty="0">
+              <a:latin typeface="Arial" panose="020B0604020202020204" pitchFamily="34" charset="0"/>
+              <a:cs typeface="Arial" panose="020B0604020202020204" pitchFamily="34" charset="0"/>
+              <a:sym typeface="+mn-ea"/>
+              <a:hlinkClick r:id="rId3"/>
+            </a:endParaRPr>
+          </a:p>
+          <a:p>
+            <a:pPr marL="962025" lvl="1" indent="-514350" algn="just" hangingPunct="1">
+              <a:buFont typeface="+mj-lt"/>
+              <a:buAutoNum type="arabicPeriod"/>
+            </a:pPr>
+            <a:r>
+              <a:rPr lang="pt-BR" dirty="0">
+                <a:latin typeface="Arial" panose="020B0604020202020204" pitchFamily="34" charset="0"/>
+                <a:cs typeface="Arial" panose="020B0604020202020204" pitchFamily="34" charset="0"/>
+                <a:sym typeface="+mn-ea"/>
+                <a:hlinkClick r:id="rId3"/>
+              </a:rPr>
+              <a:t>https://youtu.be/SQqqiC0YpA0</a:t>
+            </a:r>
+            <a:endParaRPr lang="pt-BR" dirty="0">
+              <a:latin typeface="Arial" panose="020B0604020202020204" pitchFamily="34" charset="0"/>
+              <a:cs typeface="Arial" panose="020B0604020202020204" pitchFamily="34" charset="0"/>
+              <a:sym typeface="+mn-ea"/>
+            </a:endParaRPr>
+          </a:p>
+          <a:p>
+            <a:pPr marL="962025" lvl="1" indent="-514350" algn="just" hangingPunct="1">
+              <a:buFont typeface="+mj-lt"/>
+              <a:buAutoNum type="arabicPeriod"/>
+            </a:pPr>
+            <a:endParaRPr lang="pt-BR" dirty="0">
+              <a:latin typeface="Arial" panose="020B0604020202020204" pitchFamily="34" charset="0"/>
+              <a:cs typeface="Arial" panose="020B0604020202020204" pitchFamily="34" charset="0"/>
+              <a:sym typeface="+mn-ea"/>
+            </a:endParaRPr>
+          </a:p>
+          <a:p>
+            <a:pPr marL="962025" lvl="1" indent="-514350" algn="just" hangingPunct="1">
+              <a:buFont typeface="+mj-lt"/>
+              <a:buAutoNum type="arabicPeriod"/>
+            </a:pPr>
+            <a:endParaRPr lang="pt-BR" dirty="0">
+              <a:latin typeface="Arial" panose="020B0604020202020204" pitchFamily="34" charset="0"/>
+              <a:cs typeface="Arial" panose="020B0604020202020204" pitchFamily="34" charset="0"/>
+              <a:sym typeface="+mn-ea"/>
+            </a:endParaRPr>
+          </a:p>
+          <a:p>
+            <a:pPr marL="962025" lvl="1" indent="-514350" algn="just" hangingPunct="1">
+              <a:buFont typeface="+mj-lt"/>
+              <a:buAutoNum type="arabicPeriod"/>
+            </a:pPr>
+            <a:r>
+              <a:rPr lang="pt-BR" dirty="0">
+                <a:latin typeface="Arial" panose="020B0604020202020204" pitchFamily="34" charset="0"/>
+                <a:cs typeface="Arial" panose="020B0604020202020204" pitchFamily="34" charset="0"/>
+                <a:sym typeface="+mn-ea"/>
+                <a:hlinkClick r:id="rId4"/>
+              </a:rPr>
+              <a:t>https://youtu.be/r0CyMrZBYa4</a:t>
+            </a:r>
+            <a:r>
+              <a:rPr lang="pt-BR" dirty="0">
+                <a:latin typeface="Arial" panose="020B0604020202020204" pitchFamily="34" charset="0"/>
+                <a:cs typeface="Arial" panose="020B0604020202020204" pitchFamily="34" charset="0"/>
+                <a:sym typeface="+mn-ea"/>
+              </a:rPr>
+              <a:t>  </a:t>
+            </a:r>
+          </a:p>
+        </p:txBody>
+      </p:sp>
+    </p:spTree>
+    <p:extLst>
+      <p:ext uri="{BB962C8B-B14F-4D97-AF65-F5344CB8AC3E}">
+        <p14:creationId xmlns:p14="http://schemas.microsoft.com/office/powerpoint/2010/main" val="176290578"/>
+      </p:ext>
+    </p:extLst>
+  </p:cSld>
+  <p:clrMapOvr>
+    <a:masterClrMapping/>
+  </p:clrMapOvr>
+  <p:transition spd="med"/>
+</p:sld>
+</file>
+
+<file path=ppt/slides/slide41.xml><?xml version="1.0" encoding="utf-8"?>
 <p:sld xmlns:a="http://schemas.openxmlformats.org/drawingml/2006/main" xmlns:r="http://schemas.openxmlformats.org/officeDocument/2006/relationships" xmlns:p="http://schemas.openxmlformats.org/presentationml/2006/main">
   <p:cSld>
     <p:spTree>
@@ -23228,172 +25469,6 @@
               </a:rPr>
               <a:t>. Heleno Cardoso</a:t>
             </a:r>
-          </a:p>
-        </p:txBody>
-      </p:sp>
-    </p:spTree>
-  </p:cSld>
-  <p:clrMapOvr>
-    <a:masterClrMapping/>
-  </p:clrMapOvr>
-  <p:transition spd="med"/>
-</p:sld>
-</file>
-
-<file path=ppt/slides/slide4.xml><?xml version="1.0" encoding="utf-8"?>
-<p:sld xmlns:a="http://schemas.openxmlformats.org/drawingml/2006/main" xmlns:r="http://schemas.openxmlformats.org/officeDocument/2006/relationships" xmlns:p="http://schemas.openxmlformats.org/presentationml/2006/main">
-  <p:cSld>
-    <p:spTree>
-      <p:nvGrpSpPr>
-        <p:cNvPr id="1" name=""/>
-        <p:cNvGrpSpPr/>
-        <p:nvPr/>
-      </p:nvGrpSpPr>
-      <p:grpSpPr>
-        <a:xfrm>
-          <a:off x="0" y="0"/>
-          <a:ext cx="0" cy="0"/>
-          <a:chOff x="0" y="0"/>
-          <a:chExt cx="0" cy="0"/>
-        </a:xfrm>
-      </p:grpSpPr>
-      <p:sp>
-        <p:nvSpPr>
-          <p:cNvPr id="6" name="Title 1"/>
-          <p:cNvSpPr>
-            <a:spLocks noGrp="1"/>
-          </p:cNvSpPr>
-          <p:nvPr>
-            <p:ph type="title"/>
-          </p:nvPr>
-        </p:nvSpPr>
-        <p:spPr>
-          <a:xfrm>
-            <a:off x="457200" y="205979"/>
-            <a:ext cx="8229600" cy="857251"/>
-          </a:xfrm>
-        </p:spPr>
-        <p:txBody>
-          <a:bodyPr/>
-          <a:lstStyle/>
-          <a:p>
-            <a:r>
-              <a:rPr lang="en-US" b="1" dirty="0" err="1">
-                <a:solidFill>
-                  <a:srgbClr val="0070C0"/>
-                </a:solidFill>
-              </a:rPr>
-              <a:t>Refatoração</a:t>
-            </a:r>
-            <a:r>
-              <a:rPr lang="en-US" b="1" dirty="0">
-                <a:solidFill>
-                  <a:srgbClr val="0070C0"/>
-                </a:solidFill>
-              </a:rPr>
-              <a:t> – </a:t>
-            </a:r>
-            <a:r>
-              <a:rPr lang="en-US" b="1" dirty="0" err="1">
-                <a:solidFill>
-                  <a:srgbClr val="0070C0"/>
-                </a:solidFill>
-              </a:rPr>
-              <a:t>Por</a:t>
-            </a:r>
-            <a:r>
-              <a:rPr lang="en-US" b="1" dirty="0">
-                <a:solidFill>
-                  <a:srgbClr val="0070C0"/>
-                </a:solidFill>
-              </a:rPr>
-              <a:t> que?</a:t>
-            </a:r>
-          </a:p>
-        </p:txBody>
-      </p:sp>
-      <p:sp>
-        <p:nvSpPr>
-          <p:cNvPr id="8" name="Text Placeholder 2"/>
-          <p:cNvSpPr>
-            <a:spLocks noGrp="1"/>
-          </p:cNvSpPr>
-          <p:nvPr>
-            <p:ph type="body" sz="half" idx="1"/>
-          </p:nvPr>
-        </p:nvSpPr>
-        <p:spPr>
-          <a:xfrm>
-            <a:off x="457200" y="1200151"/>
-            <a:ext cx="8572500" cy="3394472"/>
-          </a:xfrm>
-        </p:spPr>
-        <p:txBody>
-          <a:bodyPr>
-            <a:noAutofit/>
-          </a:bodyPr>
-          <a:lstStyle/>
-          <a:p>
-            <a:pPr algn="just">
-              <a:buFont typeface="Wingdings" panose="05000000000000000000" pitchFamily="2" charset="2"/>
-              <a:buChar char="§"/>
-            </a:pPr>
-            <a:r>
-              <a:rPr lang="pt-BR" dirty="0">
-                <a:latin typeface="Arial" panose="020B0604020202020204" pitchFamily="34" charset="0"/>
-                <a:cs typeface="Arial" panose="020B0604020202020204" pitchFamily="34" charset="0"/>
-              </a:rPr>
-              <a:t>Melhora o projeto do software</a:t>
-            </a:r>
-          </a:p>
-          <a:p>
-            <a:pPr algn="just">
-              <a:buFont typeface="Wingdings" panose="05000000000000000000" pitchFamily="2" charset="2"/>
-              <a:buChar char="§"/>
-            </a:pPr>
-            <a:r>
-              <a:rPr lang="pt-BR" dirty="0">
-                <a:latin typeface="Arial" panose="020B0604020202020204" pitchFamily="34" charset="0"/>
-                <a:cs typeface="Arial" panose="020B0604020202020204" pitchFamily="34" charset="0"/>
-              </a:rPr>
-              <a:t>Torna o software mais fácil de entender</a:t>
-            </a:r>
-          </a:p>
-          <a:p>
-            <a:pPr algn="just">
-              <a:buFont typeface="Wingdings" panose="05000000000000000000" pitchFamily="2" charset="2"/>
-              <a:buChar char="§"/>
-            </a:pPr>
-            <a:r>
-              <a:rPr lang="pt-BR" dirty="0">
-                <a:latin typeface="Arial" panose="020B0604020202020204" pitchFamily="34" charset="0"/>
-                <a:cs typeface="Arial" panose="020B0604020202020204" pitchFamily="34" charset="0"/>
-              </a:rPr>
-              <a:t>Ajuda a encontrar falhas</a:t>
-            </a:r>
-          </a:p>
-          <a:p>
-            <a:pPr algn="just">
-              <a:buFont typeface="Wingdings" panose="05000000000000000000" pitchFamily="2" charset="2"/>
-              <a:buChar char="§"/>
-            </a:pPr>
-            <a:r>
-              <a:rPr lang="pt-BR" dirty="0">
-                <a:latin typeface="Arial" panose="020B0604020202020204" pitchFamily="34" charset="0"/>
-                <a:cs typeface="Arial" panose="020B0604020202020204" pitchFamily="34" charset="0"/>
-              </a:rPr>
-              <a:t>Ajuda a programar mais rapidamente</a:t>
-            </a:r>
-          </a:p>
-          <a:p>
-            <a:pPr algn="just">
-              <a:buFont typeface="Wingdings" panose="05000000000000000000" pitchFamily="2" charset="2"/>
-              <a:buChar char="§"/>
-            </a:pPr>
-            <a:endParaRPr lang="pt-PT" altLang="pt-BR" dirty="0">
-              <a:latin typeface="Arial" panose="020B0604020202020204" pitchFamily="34" charset="0"/>
-              <a:cs typeface="Arial" panose="020B0604020202020204" pitchFamily="34" charset="0"/>
-            </a:endParaRPr>
           </a:p>
         </p:txBody>
       </p:sp>

</xml_diff>

<commit_message>
Eng Software ajustes 19/09/2024 2024.2
</commit_message>
<xml_diff>
--- a/01 Classes/Aulas 05 e 06 Refatoração e Code-Smell.pptx
+++ b/01 Classes/Aulas 05 e 06 Refatoração e Code-Smell.pptx
@@ -21633,18 +21633,92 @@
             </a:r>
           </a:p>
           <a:p>
-            <a:pPr algn="just" hangingPunct="1">
-              <a:buFont typeface="Wingdings" panose="05000000000000000000" pitchFamily="2" charset="2"/>
-              <a:buChar char="§"/>
+            <a:pPr marL="0" indent="0" algn="just" hangingPunct="1">
+              <a:buNone/>
             </a:pPr>
-            <a:endParaRPr lang="pt-BR" sz="2200" dirty="0">
-              <a:solidFill>
-                <a:schemeClr val="tx1"/>
-              </a:solidFill>
-              <a:latin typeface="Arial" panose="020B0604020202020204" pitchFamily="34" charset="0"/>
-              <a:cs typeface="Arial" panose="020B0604020202020204" pitchFamily="34" charset="0"/>
-              <a:sym typeface="+mn-ea"/>
-            </a:endParaRPr>
+            <a:r>
+              <a:rPr lang="pt-BR" sz="2200" dirty="0">
+                <a:solidFill>
+                  <a:schemeClr val="tx1"/>
+                </a:solidFill>
+                <a:latin typeface="Arial" panose="020B0604020202020204" pitchFamily="34" charset="0"/>
+                <a:cs typeface="Arial" panose="020B0604020202020204" pitchFamily="34" charset="0"/>
+                <a:sym typeface="+mn-ea"/>
+              </a:rPr>
+              <a:t>    </a:t>
+            </a:r>
+            <a:r>
+              <a:rPr lang="pt-BR" sz="2200" b="1" dirty="0">
+                <a:solidFill>
+                  <a:schemeClr val="tx1"/>
+                </a:solidFill>
+                <a:latin typeface="Arial" panose="020B0604020202020204" pitchFamily="34" charset="0"/>
+                <a:cs typeface="Arial" panose="020B0604020202020204" pitchFamily="34" charset="0"/>
+                <a:sym typeface="+mn-ea"/>
+              </a:rPr>
+              <a:t>URL</a:t>
+            </a:r>
+            <a:r>
+              <a:rPr lang="pt-BR" sz="2200" dirty="0">
+                <a:solidFill>
+                  <a:schemeClr val="tx1"/>
+                </a:solidFill>
+                <a:latin typeface="Arial" panose="020B0604020202020204" pitchFamily="34" charset="0"/>
+                <a:cs typeface="Arial" panose="020B0604020202020204" pitchFamily="34" charset="0"/>
+                <a:sym typeface="+mn-ea"/>
+              </a:rPr>
+              <a:t>: </a:t>
+            </a:r>
+            <a:r>
+              <a:rPr lang="pt-BR" sz="2200" b="1" dirty="0">
+                <a:solidFill>
+                  <a:schemeClr val="tx1"/>
+                </a:solidFill>
+                <a:latin typeface="Arial" panose="020B0604020202020204" pitchFamily="34" charset="0"/>
+                <a:cs typeface="Arial" panose="020B0604020202020204" pitchFamily="34" charset="0"/>
+                <a:sym typeface="+mn-ea"/>
+              </a:rPr>
+              <a:t>Dicionário do Programador</a:t>
+            </a:r>
+          </a:p>
+          <a:p>
+            <a:pPr marL="0" indent="0" algn="just" hangingPunct="1">
+              <a:buNone/>
+            </a:pPr>
+            <a:r>
+              <a:rPr lang="pt-BR" sz="2200" dirty="0">
+                <a:solidFill>
+                  <a:schemeClr val="tx1"/>
+                </a:solidFill>
+                <a:latin typeface="Arial" panose="020B0604020202020204" pitchFamily="34" charset="0"/>
+                <a:cs typeface="Arial" panose="020B0604020202020204" pitchFamily="34" charset="0"/>
+                <a:sym typeface="+mn-ea"/>
+              </a:rPr>
+              <a:t>		</a:t>
+            </a:r>
+            <a:r>
+              <a:rPr lang="pt-BR" sz="2200" dirty="0">
+                <a:solidFill>
+                  <a:schemeClr val="tx1"/>
+                </a:solidFill>
+                <a:latin typeface="Arial" panose="020B0604020202020204" pitchFamily="34" charset="0"/>
+                <a:cs typeface="Arial" panose="020B0604020202020204" pitchFamily="34" charset="0"/>
+                <a:sym typeface="+mn-ea"/>
+                <a:hlinkClick r:id="rId3"/>
+              </a:rPr>
+              <a:t>https://youtu.be/mkx0CdWiPRA</a:t>
+            </a:r>
+            <a:r>
+              <a:rPr lang="pt-BR" sz="2200" dirty="0">
+                <a:solidFill>
+                  <a:schemeClr val="tx1"/>
+                </a:solidFill>
+                <a:latin typeface="Arial" panose="020B0604020202020204" pitchFamily="34" charset="0"/>
+                <a:cs typeface="Arial" panose="020B0604020202020204" pitchFamily="34" charset="0"/>
+                <a:sym typeface="+mn-ea"/>
+              </a:rPr>
+              <a:t> </a:t>
+            </a:r>
           </a:p>
         </p:txBody>
       </p:sp>

</xml_diff>